<commit_message>
Adding first version of the hw side. Testbench and Verilog Project
</commit_message>
<xml_diff>
--- a/doc/raspberry_de0_hsm.pptx
+++ b/doc/raspberry_de0_hsm.pptx
@@ -266,7 +266,7 @@
           <a:p>
             <a:fld id="{838D13C5-DE11-46B3-A601-50927F3A22ED}" type="datetimeFigureOut">
               <a:rPr lang="es-419" smtClean="0"/>
-              <a:t>24/1/2020</a:t>
+              <a:t>25/1/2020</a:t>
             </a:fld>
             <a:endParaRPr lang="es-419"/>
           </a:p>
@@ -466,7 +466,7 @@
           <a:p>
             <a:fld id="{838D13C5-DE11-46B3-A601-50927F3A22ED}" type="datetimeFigureOut">
               <a:rPr lang="es-419" smtClean="0"/>
-              <a:t>24/1/2020</a:t>
+              <a:t>25/1/2020</a:t>
             </a:fld>
             <a:endParaRPr lang="es-419"/>
           </a:p>
@@ -676,7 +676,7 @@
           <a:p>
             <a:fld id="{838D13C5-DE11-46B3-A601-50927F3A22ED}" type="datetimeFigureOut">
               <a:rPr lang="es-419" smtClean="0"/>
-              <a:t>24/1/2020</a:t>
+              <a:t>25/1/2020</a:t>
             </a:fld>
             <a:endParaRPr lang="es-419"/>
           </a:p>
@@ -876,7 +876,7 @@
           <a:p>
             <a:fld id="{838D13C5-DE11-46B3-A601-50927F3A22ED}" type="datetimeFigureOut">
               <a:rPr lang="es-419" smtClean="0"/>
-              <a:t>24/1/2020</a:t>
+              <a:t>25/1/2020</a:t>
             </a:fld>
             <a:endParaRPr lang="es-419"/>
           </a:p>
@@ -1152,7 +1152,7 @@
           <a:p>
             <a:fld id="{838D13C5-DE11-46B3-A601-50927F3A22ED}" type="datetimeFigureOut">
               <a:rPr lang="es-419" smtClean="0"/>
-              <a:t>24/1/2020</a:t>
+              <a:t>25/1/2020</a:t>
             </a:fld>
             <a:endParaRPr lang="es-419"/>
           </a:p>
@@ -1420,7 +1420,7 @@
           <a:p>
             <a:fld id="{838D13C5-DE11-46B3-A601-50927F3A22ED}" type="datetimeFigureOut">
               <a:rPr lang="es-419" smtClean="0"/>
-              <a:t>24/1/2020</a:t>
+              <a:t>25/1/2020</a:t>
             </a:fld>
             <a:endParaRPr lang="es-419"/>
           </a:p>
@@ -1835,7 +1835,7 @@
           <a:p>
             <a:fld id="{838D13C5-DE11-46B3-A601-50927F3A22ED}" type="datetimeFigureOut">
               <a:rPr lang="es-419" smtClean="0"/>
-              <a:t>24/1/2020</a:t>
+              <a:t>25/1/2020</a:t>
             </a:fld>
             <a:endParaRPr lang="es-419"/>
           </a:p>
@@ -1977,7 +1977,7 @@
           <a:p>
             <a:fld id="{838D13C5-DE11-46B3-A601-50927F3A22ED}" type="datetimeFigureOut">
               <a:rPr lang="es-419" smtClean="0"/>
-              <a:t>24/1/2020</a:t>
+              <a:t>25/1/2020</a:t>
             </a:fld>
             <a:endParaRPr lang="es-419"/>
           </a:p>
@@ -2090,7 +2090,7 @@
           <a:p>
             <a:fld id="{838D13C5-DE11-46B3-A601-50927F3A22ED}" type="datetimeFigureOut">
               <a:rPr lang="es-419" smtClean="0"/>
-              <a:t>24/1/2020</a:t>
+              <a:t>25/1/2020</a:t>
             </a:fld>
             <a:endParaRPr lang="es-419"/>
           </a:p>
@@ -2403,7 +2403,7 @@
           <a:p>
             <a:fld id="{838D13C5-DE11-46B3-A601-50927F3A22ED}" type="datetimeFigureOut">
               <a:rPr lang="es-419" smtClean="0"/>
-              <a:t>24/1/2020</a:t>
+              <a:t>25/1/2020</a:t>
             </a:fld>
             <a:endParaRPr lang="es-419"/>
           </a:p>
@@ -2692,7 +2692,7 @@
           <a:p>
             <a:fld id="{838D13C5-DE11-46B3-A601-50927F3A22ED}" type="datetimeFigureOut">
               <a:rPr lang="es-419" smtClean="0"/>
-              <a:t>24/1/2020</a:t>
+              <a:t>25/1/2020</a:t>
             </a:fld>
             <a:endParaRPr lang="es-419"/>
           </a:p>
@@ -2935,7 +2935,7 @@
           <a:p>
             <a:fld id="{838D13C5-DE11-46B3-A601-50927F3A22ED}" type="datetimeFigureOut">
               <a:rPr lang="es-419" smtClean="0"/>
-              <a:t>24/1/2020</a:t>
+              <a:t>25/1/2020</a:t>
             </a:fld>
             <a:endParaRPr lang="es-419"/>
           </a:p>
@@ -3376,20 +3376,8 @@
           <a:lstStyle/>
           <a:p>
             <a:r>
-              <a:rPr lang="es-419" dirty="0" err="1"/>
-              <a:t>Interfáz</a:t>
-            </a:r>
-            <a:r>
               <a:rPr lang="es-419" dirty="0"/>
-              <a:t> </a:t>
-            </a:r>
-            <a:r>
-              <a:rPr lang="es-419" dirty="0" err="1"/>
-              <a:t>Arm</a:t>
-            </a:r>
-            <a:r>
-              <a:rPr lang="es-419" dirty="0"/>
-              <a:t> y </a:t>
+              <a:t>Interfaz ARMv7 y </a:t>
             </a:r>
             <a:r>
               <a:rPr lang="es-419" dirty="0" err="1"/>
@@ -3424,10 +3412,29 @@
         </p:nvSpPr>
         <p:spPr/>
         <p:txBody>
-          <a:bodyPr/>
+          <a:bodyPr>
+            <a:normAutofit lnSpcReduction="10000"/>
+          </a:bodyPr>
           <a:lstStyle/>
           <a:p>
             <a:endParaRPr lang="es-419" dirty="0"/>
+          </a:p>
+          <a:p>
+            <a:endParaRPr lang="es-419" dirty="0"/>
+          </a:p>
+          <a:p>
+            <a:endParaRPr lang="es-419" dirty="0"/>
+          </a:p>
+          <a:p>
+            <a:pPr algn="l"/>
+            <a:r>
+              <a:rPr lang="es-419"/>
+              <a:t>Rommel </a:t>
+            </a:r>
+            <a:r>
+              <a:rPr lang="es-419" dirty="0"/>
+              <a:t>García Hernández</a:t>
+            </a:r>
           </a:p>
         </p:txBody>
       </p:sp>

</xml_diff>

<commit_message>
adding version of the hw
</commit_message>
<xml_diff>
--- a/doc/raspberry_de0_hsm.pptx
+++ b/doc/raspberry_de0_hsm.pptx
@@ -11,6 +11,28 @@
     <p:sldId id="258" r:id="rId5"/>
     <p:sldId id="259" r:id="rId6"/>
     <p:sldId id="262" r:id="rId7"/>
+    <p:sldId id="266" r:id="rId8"/>
+    <p:sldId id="267" r:id="rId9"/>
+    <p:sldId id="268" r:id="rId10"/>
+    <p:sldId id="269" r:id="rId11"/>
+    <p:sldId id="278" r:id="rId12"/>
+    <p:sldId id="270" r:id="rId13"/>
+    <p:sldId id="271" r:id="rId14"/>
+    <p:sldId id="272" r:id="rId15"/>
+    <p:sldId id="273" r:id="rId16"/>
+    <p:sldId id="274" r:id="rId17"/>
+    <p:sldId id="275" r:id="rId18"/>
+    <p:sldId id="276" r:id="rId19"/>
+    <p:sldId id="277" r:id="rId20"/>
+    <p:sldId id="279" r:id="rId21"/>
+    <p:sldId id="280" r:id="rId22"/>
+    <p:sldId id="282" r:id="rId23"/>
+    <p:sldId id="284" r:id="rId24"/>
+    <p:sldId id="283" r:id="rId25"/>
+    <p:sldId id="281" r:id="rId26"/>
+    <p:sldId id="285" r:id="rId27"/>
+    <p:sldId id="286" r:id="rId28"/>
+    <p:sldId id="287" r:id="rId29"/>
   </p:sldIdLst>
   <p:sldSz cx="12192000" cy="6858000"/>
   <p:notesSz cx="6858000" cy="9144000"/>
@@ -266,7 +288,7 @@
           <a:p>
             <a:fld id="{838D13C5-DE11-46B3-A601-50927F3A22ED}" type="datetimeFigureOut">
               <a:rPr lang="es-419" smtClean="0"/>
-              <a:t>25/1/2020</a:t>
+              <a:t>8/2/2020</a:t>
             </a:fld>
             <a:endParaRPr lang="es-419"/>
           </a:p>
@@ -466,7 +488,7 @@
           <a:p>
             <a:fld id="{838D13C5-DE11-46B3-A601-50927F3A22ED}" type="datetimeFigureOut">
               <a:rPr lang="es-419" smtClean="0"/>
-              <a:t>25/1/2020</a:t>
+              <a:t>8/2/2020</a:t>
             </a:fld>
             <a:endParaRPr lang="es-419"/>
           </a:p>
@@ -676,7 +698,7 @@
           <a:p>
             <a:fld id="{838D13C5-DE11-46B3-A601-50927F3A22ED}" type="datetimeFigureOut">
               <a:rPr lang="es-419" smtClean="0"/>
-              <a:t>25/1/2020</a:t>
+              <a:t>8/2/2020</a:t>
             </a:fld>
             <a:endParaRPr lang="es-419"/>
           </a:p>
@@ -876,7 +898,7 @@
           <a:p>
             <a:fld id="{838D13C5-DE11-46B3-A601-50927F3A22ED}" type="datetimeFigureOut">
               <a:rPr lang="es-419" smtClean="0"/>
-              <a:t>25/1/2020</a:t>
+              <a:t>8/2/2020</a:t>
             </a:fld>
             <a:endParaRPr lang="es-419"/>
           </a:p>
@@ -1152,7 +1174,7 @@
           <a:p>
             <a:fld id="{838D13C5-DE11-46B3-A601-50927F3A22ED}" type="datetimeFigureOut">
               <a:rPr lang="es-419" smtClean="0"/>
-              <a:t>25/1/2020</a:t>
+              <a:t>8/2/2020</a:t>
             </a:fld>
             <a:endParaRPr lang="es-419"/>
           </a:p>
@@ -1420,7 +1442,7 @@
           <a:p>
             <a:fld id="{838D13C5-DE11-46B3-A601-50927F3A22ED}" type="datetimeFigureOut">
               <a:rPr lang="es-419" smtClean="0"/>
-              <a:t>25/1/2020</a:t>
+              <a:t>8/2/2020</a:t>
             </a:fld>
             <a:endParaRPr lang="es-419"/>
           </a:p>
@@ -1835,7 +1857,7 @@
           <a:p>
             <a:fld id="{838D13C5-DE11-46B3-A601-50927F3A22ED}" type="datetimeFigureOut">
               <a:rPr lang="es-419" smtClean="0"/>
-              <a:t>25/1/2020</a:t>
+              <a:t>8/2/2020</a:t>
             </a:fld>
             <a:endParaRPr lang="es-419"/>
           </a:p>
@@ -1977,7 +1999,7 @@
           <a:p>
             <a:fld id="{838D13C5-DE11-46B3-A601-50927F3A22ED}" type="datetimeFigureOut">
               <a:rPr lang="es-419" smtClean="0"/>
-              <a:t>25/1/2020</a:t>
+              <a:t>8/2/2020</a:t>
             </a:fld>
             <a:endParaRPr lang="es-419"/>
           </a:p>
@@ -2090,7 +2112,7 @@
           <a:p>
             <a:fld id="{838D13C5-DE11-46B3-A601-50927F3A22ED}" type="datetimeFigureOut">
               <a:rPr lang="es-419" smtClean="0"/>
-              <a:t>25/1/2020</a:t>
+              <a:t>8/2/2020</a:t>
             </a:fld>
             <a:endParaRPr lang="es-419"/>
           </a:p>
@@ -2403,7 +2425,7 @@
           <a:p>
             <a:fld id="{838D13C5-DE11-46B3-A601-50927F3A22ED}" type="datetimeFigureOut">
               <a:rPr lang="es-419" smtClean="0"/>
-              <a:t>25/1/2020</a:t>
+              <a:t>8/2/2020</a:t>
             </a:fld>
             <a:endParaRPr lang="es-419"/>
           </a:p>
@@ -2692,7 +2714,7 @@
           <a:p>
             <a:fld id="{838D13C5-DE11-46B3-A601-50927F3A22ED}" type="datetimeFigureOut">
               <a:rPr lang="es-419" smtClean="0"/>
-              <a:t>25/1/2020</a:t>
+              <a:t>8/2/2020</a:t>
             </a:fld>
             <a:endParaRPr lang="es-419"/>
           </a:p>
@@ -2935,7 +2957,7 @@
           <a:p>
             <a:fld id="{838D13C5-DE11-46B3-A601-50927F3A22ED}" type="datetimeFigureOut">
               <a:rPr lang="es-419" smtClean="0"/>
-              <a:t>25/1/2020</a:t>
+              <a:t>8/2/2020</a:t>
             </a:fld>
             <a:endParaRPr lang="es-419"/>
           </a:p>
@@ -3451,6 +3473,1028 @@
 </p:sld>
 </file>
 
+<file path=ppt/slides/slide10.xml><?xml version="1.0" encoding="utf-8"?>
+<p:sld xmlns:a="http://schemas.openxmlformats.org/drawingml/2006/main" xmlns:r="http://schemas.openxmlformats.org/officeDocument/2006/relationships" xmlns:p="http://schemas.openxmlformats.org/presentationml/2006/main">
+  <p:cSld>
+    <p:spTree>
+      <p:nvGrpSpPr>
+        <p:cNvPr id="1" name=""/>
+        <p:cNvGrpSpPr/>
+        <p:nvPr/>
+      </p:nvGrpSpPr>
+      <p:grpSpPr>
+        <a:xfrm>
+          <a:off x="0" y="0"/>
+          <a:ext cx="0" cy="0"/>
+          <a:chOff x="0" y="0"/>
+          <a:chExt cx="0" cy="0"/>
+        </a:xfrm>
+      </p:grpSpPr>
+      <p:sp>
+        <p:nvSpPr>
+          <p:cNvPr id="2" name="Title 1">
+            <a:extLst>
+              <a:ext uri="{FF2B5EF4-FFF2-40B4-BE49-F238E27FC236}">
+                <a16:creationId xmlns:a16="http://schemas.microsoft.com/office/drawing/2014/main" id="{3A7A4976-254B-45FF-89E4-3B8E9B14DD4B}"/>
+              </a:ext>
+            </a:extLst>
+          </p:cNvPr>
+          <p:cNvSpPr>
+            <a:spLocks noGrp="1"/>
+          </p:cNvSpPr>
+          <p:nvPr>
+            <p:ph type="title"/>
+          </p:nvPr>
+        </p:nvSpPr>
+        <p:spPr/>
+        <p:txBody>
+          <a:bodyPr/>
+          <a:lstStyle/>
+          <a:p>
+            <a:r>
+              <a:rPr lang="es-419" dirty="0"/>
+              <a:t>Aplicación </a:t>
+            </a:r>
+            <a:r>
+              <a:rPr lang="es-419" dirty="0" err="1"/>
+              <a:t>TkInter</a:t>
+            </a:r>
+            <a:endParaRPr lang="es-419" dirty="0"/>
+          </a:p>
+        </p:txBody>
+      </p:sp>
+      <p:pic>
+        <p:nvPicPr>
+          <p:cNvPr id="4" name="Content Placeholder 3">
+            <a:extLst>
+              <a:ext uri="{FF2B5EF4-FFF2-40B4-BE49-F238E27FC236}">
+                <a16:creationId xmlns:a16="http://schemas.microsoft.com/office/drawing/2014/main" id="{2F47B1CE-3D93-4568-A480-457A4BCD0890}"/>
+              </a:ext>
+            </a:extLst>
+          </p:cNvPr>
+          <p:cNvPicPr>
+            <a:picLocks noGrp="1"/>
+          </p:cNvPicPr>
+          <p:nvPr>
+            <p:ph idx="1"/>
+          </p:nvPr>
+        </p:nvPicPr>
+        <p:blipFill>
+          <a:blip r:embed="rId2"/>
+          <a:stretch>
+            <a:fillRect/>
+          </a:stretch>
+        </p:blipFill>
+        <p:spPr>
+          <a:xfrm>
+            <a:off x="3337089" y="2121032"/>
+            <a:ext cx="6901992" cy="3094405"/>
+          </a:xfrm>
+          <a:prstGeom prst="rect">
+            <a:avLst/>
+          </a:prstGeom>
+        </p:spPr>
+      </p:pic>
+    </p:spTree>
+    <p:extLst>
+      <p:ext uri="{BB962C8B-B14F-4D97-AF65-F5344CB8AC3E}">
+        <p14:creationId xmlns:p14="http://schemas.microsoft.com/office/powerpoint/2010/main" val="3870281290"/>
+      </p:ext>
+    </p:extLst>
+  </p:cSld>
+  <p:clrMapOvr>
+    <a:masterClrMapping/>
+  </p:clrMapOvr>
+</p:sld>
+</file>
+
+<file path=ppt/slides/slide11.xml><?xml version="1.0" encoding="utf-8"?>
+<p:sld xmlns:a="http://schemas.openxmlformats.org/drawingml/2006/main" xmlns:r="http://schemas.openxmlformats.org/officeDocument/2006/relationships" xmlns:p="http://schemas.openxmlformats.org/presentationml/2006/main">
+  <p:cSld>
+    <p:spTree>
+      <p:nvGrpSpPr>
+        <p:cNvPr id="1" name=""/>
+        <p:cNvGrpSpPr/>
+        <p:nvPr/>
+      </p:nvGrpSpPr>
+      <p:grpSpPr>
+        <a:xfrm>
+          <a:off x="0" y="0"/>
+          <a:ext cx="0" cy="0"/>
+          <a:chOff x="0" y="0"/>
+          <a:chExt cx="0" cy="0"/>
+        </a:xfrm>
+      </p:grpSpPr>
+      <p:sp>
+        <p:nvSpPr>
+          <p:cNvPr id="2" name="Title 1">
+            <a:extLst>
+              <a:ext uri="{FF2B5EF4-FFF2-40B4-BE49-F238E27FC236}">
+                <a16:creationId xmlns:a16="http://schemas.microsoft.com/office/drawing/2014/main" id="{75B1951D-68EA-4A12-BCD7-FAAE87567EF9}"/>
+              </a:ext>
+            </a:extLst>
+          </p:cNvPr>
+          <p:cNvSpPr>
+            <a:spLocks noGrp="1"/>
+          </p:cNvSpPr>
+          <p:nvPr>
+            <p:ph type="title"/>
+          </p:nvPr>
+        </p:nvSpPr>
+        <p:spPr/>
+        <p:txBody>
+          <a:bodyPr/>
+          <a:lstStyle/>
+          <a:p>
+            <a:r>
+              <a:rPr lang="es-419" dirty="0"/>
+              <a:t>Aplicación </a:t>
+            </a:r>
+            <a:r>
+              <a:rPr lang="es-419" dirty="0" err="1"/>
+              <a:t>TkInter</a:t>
+            </a:r>
+            <a:endParaRPr lang="es-419" dirty="0"/>
+          </a:p>
+        </p:txBody>
+      </p:sp>
+      <p:sp>
+        <p:nvSpPr>
+          <p:cNvPr id="3" name="Content Placeholder 2">
+            <a:extLst>
+              <a:ext uri="{FF2B5EF4-FFF2-40B4-BE49-F238E27FC236}">
+                <a16:creationId xmlns:a16="http://schemas.microsoft.com/office/drawing/2014/main" id="{F82B9780-ADE7-4483-8C95-8B8D5A7D643B}"/>
+              </a:ext>
+            </a:extLst>
+          </p:cNvPr>
+          <p:cNvSpPr>
+            <a:spLocks noGrp="1"/>
+          </p:cNvSpPr>
+          <p:nvPr>
+            <p:ph idx="1"/>
+          </p:nvPr>
+        </p:nvSpPr>
+        <p:spPr/>
+        <p:txBody>
+          <a:bodyPr/>
+          <a:lstStyle/>
+          <a:p>
+            <a:r>
+              <a:rPr lang="es-419" dirty="0"/>
+              <a:t>Será adaptada a las necesidades de cifrado propuesto</a:t>
+            </a:r>
+          </a:p>
+          <a:p>
+            <a:endParaRPr lang="es-419" dirty="0"/>
+          </a:p>
+        </p:txBody>
+      </p:sp>
+      <p:pic>
+        <p:nvPicPr>
+          <p:cNvPr id="4" name="Picture 3">
+            <a:extLst>
+              <a:ext uri="{FF2B5EF4-FFF2-40B4-BE49-F238E27FC236}">
+                <a16:creationId xmlns:a16="http://schemas.microsoft.com/office/drawing/2014/main" id="{3C148235-1208-47EE-B38D-D8416019A36A}"/>
+              </a:ext>
+            </a:extLst>
+          </p:cNvPr>
+          <p:cNvPicPr/>
+          <p:nvPr/>
+        </p:nvPicPr>
+        <p:blipFill>
+          <a:blip r:embed="rId2">
+            <a:extLst>
+              <a:ext uri="{28A0092B-C50C-407E-A947-70E740481C1C}">
+                <a14:useLocalDpi xmlns:a14="http://schemas.microsoft.com/office/drawing/2010/main" val="0"/>
+              </a:ext>
+            </a:extLst>
+          </a:blip>
+          <a:srcRect/>
+          <a:stretch>
+            <a:fillRect/>
+          </a:stretch>
+        </p:blipFill>
+        <p:spPr bwMode="auto">
+          <a:xfrm>
+            <a:off x="3535052" y="2694305"/>
+            <a:ext cx="4977051" cy="3482658"/>
+          </a:xfrm>
+          <a:prstGeom prst="rect">
+            <a:avLst/>
+          </a:prstGeom>
+          <a:noFill/>
+          <a:ln>
+            <a:noFill/>
+          </a:ln>
+        </p:spPr>
+      </p:pic>
+    </p:spTree>
+    <p:extLst>
+      <p:ext uri="{BB962C8B-B14F-4D97-AF65-F5344CB8AC3E}">
+        <p14:creationId xmlns:p14="http://schemas.microsoft.com/office/powerpoint/2010/main" val="4066635710"/>
+      </p:ext>
+    </p:extLst>
+  </p:cSld>
+  <p:clrMapOvr>
+    <a:masterClrMapping/>
+  </p:clrMapOvr>
+</p:sld>
+</file>
+
+<file path=ppt/slides/slide12.xml><?xml version="1.0" encoding="utf-8"?>
+<p:sld xmlns:a="http://schemas.openxmlformats.org/drawingml/2006/main" xmlns:r="http://schemas.openxmlformats.org/officeDocument/2006/relationships" xmlns:p="http://schemas.openxmlformats.org/presentationml/2006/main">
+  <p:cSld>
+    <p:spTree>
+      <p:nvGrpSpPr>
+        <p:cNvPr id="1" name=""/>
+        <p:cNvGrpSpPr/>
+        <p:nvPr/>
+      </p:nvGrpSpPr>
+      <p:grpSpPr>
+        <a:xfrm>
+          <a:off x="0" y="0"/>
+          <a:ext cx="0" cy="0"/>
+          <a:chOff x="0" y="0"/>
+          <a:chExt cx="0" cy="0"/>
+        </a:xfrm>
+      </p:grpSpPr>
+      <p:sp>
+        <p:nvSpPr>
+          <p:cNvPr id="2" name="Title 1">
+            <a:extLst>
+              <a:ext uri="{FF2B5EF4-FFF2-40B4-BE49-F238E27FC236}">
+                <a16:creationId xmlns:a16="http://schemas.microsoft.com/office/drawing/2014/main" id="{D8942D2C-5221-425B-B5ED-300F8A2AEA2B}"/>
+              </a:ext>
+            </a:extLst>
+          </p:cNvPr>
+          <p:cNvSpPr>
+            <a:spLocks noGrp="1"/>
+          </p:cNvSpPr>
+          <p:nvPr>
+            <p:ph type="title"/>
+          </p:nvPr>
+        </p:nvSpPr>
+        <p:spPr/>
+        <p:txBody>
+          <a:bodyPr/>
+          <a:lstStyle/>
+          <a:p>
+            <a:r>
+              <a:rPr lang="es-419" dirty="0"/>
+              <a:t>Librería a bajo nivel para Raspberry  </a:t>
+            </a:r>
+          </a:p>
+        </p:txBody>
+      </p:sp>
+      <p:pic>
+        <p:nvPicPr>
+          <p:cNvPr id="4" name="Content Placeholder 3">
+            <a:extLst>
+              <a:ext uri="{FF2B5EF4-FFF2-40B4-BE49-F238E27FC236}">
+                <a16:creationId xmlns:a16="http://schemas.microsoft.com/office/drawing/2014/main" id="{ADAE6990-E6E3-47BC-A36D-2BF134AB6692}"/>
+              </a:ext>
+            </a:extLst>
+          </p:cNvPr>
+          <p:cNvPicPr>
+            <a:picLocks noGrp="1"/>
+          </p:cNvPicPr>
+          <p:nvPr>
+            <p:ph idx="1"/>
+          </p:nvPr>
+        </p:nvPicPr>
+        <p:blipFill>
+          <a:blip r:embed="rId2"/>
+          <a:stretch>
+            <a:fillRect/>
+          </a:stretch>
+        </p:blipFill>
+        <p:spPr>
+          <a:xfrm>
+            <a:off x="3487918" y="2121032"/>
+            <a:ext cx="4964980" cy="3335231"/>
+          </a:xfrm>
+          <a:prstGeom prst="rect">
+            <a:avLst/>
+          </a:prstGeom>
+        </p:spPr>
+      </p:pic>
+    </p:spTree>
+    <p:extLst>
+      <p:ext uri="{BB962C8B-B14F-4D97-AF65-F5344CB8AC3E}">
+        <p14:creationId xmlns:p14="http://schemas.microsoft.com/office/powerpoint/2010/main" val="3336599612"/>
+      </p:ext>
+    </p:extLst>
+  </p:cSld>
+  <p:clrMapOvr>
+    <a:masterClrMapping/>
+  </p:clrMapOvr>
+</p:sld>
+</file>
+
+<file path=ppt/slides/slide13.xml><?xml version="1.0" encoding="utf-8"?>
+<p:sld xmlns:a="http://schemas.openxmlformats.org/drawingml/2006/main" xmlns:r="http://schemas.openxmlformats.org/officeDocument/2006/relationships" xmlns:p="http://schemas.openxmlformats.org/presentationml/2006/main">
+  <p:cSld>
+    <p:spTree>
+      <p:nvGrpSpPr>
+        <p:cNvPr id="1" name=""/>
+        <p:cNvGrpSpPr/>
+        <p:nvPr/>
+      </p:nvGrpSpPr>
+      <p:grpSpPr>
+        <a:xfrm>
+          <a:off x="0" y="0"/>
+          <a:ext cx="0" cy="0"/>
+          <a:chOff x="0" y="0"/>
+          <a:chExt cx="0" cy="0"/>
+        </a:xfrm>
+      </p:grpSpPr>
+      <p:sp>
+        <p:nvSpPr>
+          <p:cNvPr id="2" name="Title 1">
+            <a:extLst>
+              <a:ext uri="{FF2B5EF4-FFF2-40B4-BE49-F238E27FC236}">
+                <a16:creationId xmlns:a16="http://schemas.microsoft.com/office/drawing/2014/main" id="{A2535193-F490-4297-88F8-0A8A830D08FD}"/>
+              </a:ext>
+            </a:extLst>
+          </p:cNvPr>
+          <p:cNvSpPr>
+            <a:spLocks noGrp="1"/>
+          </p:cNvSpPr>
+          <p:nvPr>
+            <p:ph type="title"/>
+          </p:nvPr>
+        </p:nvSpPr>
+        <p:spPr/>
+        <p:txBody>
+          <a:bodyPr/>
+          <a:lstStyle/>
+          <a:p>
+            <a:r>
+              <a:rPr lang="es-419" dirty="0"/>
+              <a:t>Librería a bajo nivel para Raspberry </a:t>
+            </a:r>
+          </a:p>
+        </p:txBody>
+      </p:sp>
+      <p:pic>
+        <p:nvPicPr>
+          <p:cNvPr id="5" name="Picture 4">
+            <a:extLst>
+              <a:ext uri="{FF2B5EF4-FFF2-40B4-BE49-F238E27FC236}">
+                <a16:creationId xmlns:a16="http://schemas.microsoft.com/office/drawing/2014/main" id="{46491048-5DEB-4B43-8224-9EF987F2A6FF}"/>
+              </a:ext>
+            </a:extLst>
+          </p:cNvPr>
+          <p:cNvPicPr/>
+          <p:nvPr/>
+        </p:nvPicPr>
+        <p:blipFill>
+          <a:blip r:embed="rId2"/>
+          <a:stretch>
+            <a:fillRect/>
+          </a:stretch>
+        </p:blipFill>
+        <p:spPr>
+          <a:xfrm>
+            <a:off x="2211870" y="2094196"/>
+            <a:ext cx="7768259" cy="4221761"/>
+          </a:xfrm>
+          <a:prstGeom prst="rect">
+            <a:avLst/>
+          </a:prstGeom>
+        </p:spPr>
+      </p:pic>
+    </p:spTree>
+    <p:extLst>
+      <p:ext uri="{BB962C8B-B14F-4D97-AF65-F5344CB8AC3E}">
+        <p14:creationId xmlns:p14="http://schemas.microsoft.com/office/powerpoint/2010/main" val="1568462149"/>
+      </p:ext>
+    </p:extLst>
+  </p:cSld>
+  <p:clrMapOvr>
+    <a:masterClrMapping/>
+  </p:clrMapOvr>
+</p:sld>
+</file>
+
+<file path=ppt/slides/slide14.xml><?xml version="1.0" encoding="utf-8"?>
+<p:sld xmlns:a="http://schemas.openxmlformats.org/drawingml/2006/main" xmlns:r="http://schemas.openxmlformats.org/officeDocument/2006/relationships" xmlns:p="http://schemas.openxmlformats.org/presentationml/2006/main">
+  <p:cSld>
+    <p:spTree>
+      <p:nvGrpSpPr>
+        <p:cNvPr id="1" name=""/>
+        <p:cNvGrpSpPr/>
+        <p:nvPr/>
+      </p:nvGrpSpPr>
+      <p:grpSpPr>
+        <a:xfrm>
+          <a:off x="0" y="0"/>
+          <a:ext cx="0" cy="0"/>
+          <a:chOff x="0" y="0"/>
+          <a:chExt cx="0" cy="0"/>
+        </a:xfrm>
+      </p:grpSpPr>
+      <p:sp>
+        <p:nvSpPr>
+          <p:cNvPr id="2" name="Title 1">
+            <a:extLst>
+              <a:ext uri="{FF2B5EF4-FFF2-40B4-BE49-F238E27FC236}">
+                <a16:creationId xmlns:a16="http://schemas.microsoft.com/office/drawing/2014/main" id="{01F0A4D9-1F5C-4A05-B7F2-A74F3D44DDFC}"/>
+              </a:ext>
+            </a:extLst>
+          </p:cNvPr>
+          <p:cNvSpPr>
+            <a:spLocks noGrp="1"/>
+          </p:cNvSpPr>
+          <p:nvPr>
+            <p:ph type="title"/>
+          </p:nvPr>
+        </p:nvSpPr>
+        <p:spPr/>
+        <p:txBody>
+          <a:bodyPr/>
+          <a:lstStyle/>
+          <a:p>
+            <a:r>
+              <a:rPr lang="es-419" dirty="0"/>
+              <a:t>Interfaz entre lenguajes</a:t>
+            </a:r>
+          </a:p>
+        </p:txBody>
+      </p:sp>
+      <p:pic>
+        <p:nvPicPr>
+          <p:cNvPr id="4" name="Content Placeholder 3">
+            <a:extLst>
+              <a:ext uri="{FF2B5EF4-FFF2-40B4-BE49-F238E27FC236}">
+                <a16:creationId xmlns:a16="http://schemas.microsoft.com/office/drawing/2014/main" id="{BFF68DC5-0519-40B6-9F86-FEEE065EF246}"/>
+              </a:ext>
+            </a:extLst>
+          </p:cNvPr>
+          <p:cNvPicPr>
+            <a:picLocks noGrp="1"/>
+          </p:cNvPicPr>
+          <p:nvPr>
+            <p:ph idx="1"/>
+          </p:nvPr>
+        </p:nvPicPr>
+        <p:blipFill>
+          <a:blip r:embed="rId2"/>
+          <a:stretch>
+            <a:fillRect/>
+          </a:stretch>
+        </p:blipFill>
+        <p:spPr>
+          <a:xfrm>
+            <a:off x="1621411" y="2058334"/>
+            <a:ext cx="8692004" cy="3069847"/>
+          </a:xfrm>
+          <a:prstGeom prst="rect">
+            <a:avLst/>
+          </a:prstGeom>
+        </p:spPr>
+      </p:pic>
+    </p:spTree>
+    <p:extLst>
+      <p:ext uri="{BB962C8B-B14F-4D97-AF65-F5344CB8AC3E}">
+        <p14:creationId xmlns:p14="http://schemas.microsoft.com/office/powerpoint/2010/main" val="4049629246"/>
+      </p:ext>
+    </p:extLst>
+  </p:cSld>
+  <p:clrMapOvr>
+    <a:masterClrMapping/>
+  </p:clrMapOvr>
+</p:sld>
+</file>
+
+<file path=ppt/slides/slide15.xml><?xml version="1.0" encoding="utf-8"?>
+<p:sld xmlns:a="http://schemas.openxmlformats.org/drawingml/2006/main" xmlns:r="http://schemas.openxmlformats.org/officeDocument/2006/relationships" xmlns:p="http://schemas.openxmlformats.org/presentationml/2006/main">
+  <p:cSld>
+    <p:spTree>
+      <p:nvGrpSpPr>
+        <p:cNvPr id="1" name=""/>
+        <p:cNvGrpSpPr/>
+        <p:nvPr/>
+      </p:nvGrpSpPr>
+      <p:grpSpPr>
+        <a:xfrm>
+          <a:off x="0" y="0"/>
+          <a:ext cx="0" cy="0"/>
+          <a:chOff x="0" y="0"/>
+          <a:chExt cx="0" cy="0"/>
+        </a:xfrm>
+      </p:grpSpPr>
+      <p:sp>
+        <p:nvSpPr>
+          <p:cNvPr id="2" name="Title 1">
+            <a:extLst>
+              <a:ext uri="{FF2B5EF4-FFF2-40B4-BE49-F238E27FC236}">
+                <a16:creationId xmlns:a16="http://schemas.microsoft.com/office/drawing/2014/main" id="{A826232E-8EB3-492D-844B-6A9B3070AD04}"/>
+              </a:ext>
+            </a:extLst>
+          </p:cNvPr>
+          <p:cNvSpPr>
+            <a:spLocks noGrp="1"/>
+          </p:cNvSpPr>
+          <p:nvPr>
+            <p:ph type="title"/>
+          </p:nvPr>
+        </p:nvSpPr>
+        <p:spPr/>
+        <p:txBody>
+          <a:bodyPr/>
+          <a:lstStyle/>
+          <a:p>
+            <a:r>
+              <a:rPr lang="es-419" dirty="0"/>
+              <a:t>Arquitectura Hardware</a:t>
+            </a:r>
+          </a:p>
+        </p:txBody>
+      </p:sp>
+      <p:pic>
+        <p:nvPicPr>
+          <p:cNvPr id="4" name="Content Placeholder 3">
+            <a:extLst>
+              <a:ext uri="{FF2B5EF4-FFF2-40B4-BE49-F238E27FC236}">
+                <a16:creationId xmlns:a16="http://schemas.microsoft.com/office/drawing/2014/main" id="{55B82E58-1102-457D-A5DA-95D831D69B59}"/>
+              </a:ext>
+            </a:extLst>
+          </p:cNvPr>
+          <p:cNvPicPr>
+            <a:picLocks noGrp="1"/>
+          </p:cNvPicPr>
+          <p:nvPr>
+            <p:ph idx="1"/>
+          </p:nvPr>
+        </p:nvPicPr>
+        <p:blipFill>
+          <a:blip r:embed="rId2"/>
+          <a:stretch>
+            <a:fillRect/>
+          </a:stretch>
+        </p:blipFill>
+        <p:spPr>
+          <a:xfrm>
+            <a:off x="2554664" y="1825624"/>
+            <a:ext cx="6522465" cy="5032375"/>
+          </a:xfrm>
+          <a:prstGeom prst="rect">
+            <a:avLst/>
+          </a:prstGeom>
+        </p:spPr>
+      </p:pic>
+    </p:spTree>
+    <p:extLst>
+      <p:ext uri="{BB962C8B-B14F-4D97-AF65-F5344CB8AC3E}">
+        <p14:creationId xmlns:p14="http://schemas.microsoft.com/office/powerpoint/2010/main" val="3927112351"/>
+      </p:ext>
+    </p:extLst>
+  </p:cSld>
+  <p:clrMapOvr>
+    <a:masterClrMapping/>
+  </p:clrMapOvr>
+</p:sld>
+</file>
+
+<file path=ppt/slides/slide16.xml><?xml version="1.0" encoding="utf-8"?>
+<p:sld xmlns:a="http://schemas.openxmlformats.org/drawingml/2006/main" xmlns:r="http://schemas.openxmlformats.org/officeDocument/2006/relationships" xmlns:p="http://schemas.openxmlformats.org/presentationml/2006/main">
+  <p:cSld>
+    <p:spTree>
+      <p:nvGrpSpPr>
+        <p:cNvPr id="1" name=""/>
+        <p:cNvGrpSpPr/>
+        <p:nvPr/>
+      </p:nvGrpSpPr>
+      <p:grpSpPr>
+        <a:xfrm>
+          <a:off x="0" y="0"/>
+          <a:ext cx="0" cy="0"/>
+          <a:chOff x="0" y="0"/>
+          <a:chExt cx="0" cy="0"/>
+        </a:xfrm>
+      </p:grpSpPr>
+      <p:sp>
+        <p:nvSpPr>
+          <p:cNvPr id="2" name="Title 1">
+            <a:extLst>
+              <a:ext uri="{FF2B5EF4-FFF2-40B4-BE49-F238E27FC236}">
+                <a16:creationId xmlns:a16="http://schemas.microsoft.com/office/drawing/2014/main" id="{7689E13C-D197-4A21-80E9-2D0E42C4C4DD}"/>
+              </a:ext>
+            </a:extLst>
+          </p:cNvPr>
+          <p:cNvSpPr>
+            <a:spLocks noGrp="1"/>
+          </p:cNvSpPr>
+          <p:nvPr>
+            <p:ph type="title"/>
+          </p:nvPr>
+        </p:nvSpPr>
+        <p:spPr/>
+        <p:txBody>
+          <a:bodyPr/>
+          <a:lstStyle/>
+          <a:p>
+            <a:r>
+              <a:rPr lang="es-419" dirty="0"/>
+              <a:t>Interfaz física </a:t>
+            </a:r>
+          </a:p>
+        </p:txBody>
+      </p:sp>
+      <p:pic>
+        <p:nvPicPr>
+          <p:cNvPr id="4" name="Content Placeholder 3">
+            <a:extLst>
+              <a:ext uri="{FF2B5EF4-FFF2-40B4-BE49-F238E27FC236}">
+                <a16:creationId xmlns:a16="http://schemas.microsoft.com/office/drawing/2014/main" id="{B28ECEBD-BD69-4861-901F-4A37BB2FC295}"/>
+              </a:ext>
+            </a:extLst>
+          </p:cNvPr>
+          <p:cNvPicPr>
+            <a:picLocks noGrp="1"/>
+          </p:cNvPicPr>
+          <p:nvPr>
+            <p:ph idx="1"/>
+          </p:nvPr>
+        </p:nvPicPr>
+        <p:blipFill>
+          <a:blip r:embed="rId2"/>
+          <a:stretch>
+            <a:fillRect/>
+          </a:stretch>
+        </p:blipFill>
+        <p:spPr>
+          <a:xfrm>
+            <a:off x="2843212" y="1872456"/>
+            <a:ext cx="6505575" cy="4257675"/>
+          </a:xfrm>
+          <a:prstGeom prst="rect">
+            <a:avLst/>
+          </a:prstGeom>
+        </p:spPr>
+      </p:pic>
+    </p:spTree>
+    <p:extLst>
+      <p:ext uri="{BB962C8B-B14F-4D97-AF65-F5344CB8AC3E}">
+        <p14:creationId xmlns:p14="http://schemas.microsoft.com/office/powerpoint/2010/main" val="1009940836"/>
+      </p:ext>
+    </p:extLst>
+  </p:cSld>
+  <p:clrMapOvr>
+    <a:masterClrMapping/>
+  </p:clrMapOvr>
+</p:sld>
+</file>
+
+<file path=ppt/slides/slide17.xml><?xml version="1.0" encoding="utf-8"?>
+<p:sld xmlns:a="http://schemas.openxmlformats.org/drawingml/2006/main" xmlns:r="http://schemas.openxmlformats.org/officeDocument/2006/relationships" xmlns:p="http://schemas.openxmlformats.org/presentationml/2006/main">
+  <p:cSld>
+    <p:spTree>
+      <p:nvGrpSpPr>
+        <p:cNvPr id="1" name=""/>
+        <p:cNvGrpSpPr/>
+        <p:nvPr/>
+      </p:nvGrpSpPr>
+      <p:grpSpPr>
+        <a:xfrm>
+          <a:off x="0" y="0"/>
+          <a:ext cx="0" cy="0"/>
+          <a:chOff x="0" y="0"/>
+          <a:chExt cx="0" cy="0"/>
+        </a:xfrm>
+      </p:grpSpPr>
+      <p:sp>
+        <p:nvSpPr>
+          <p:cNvPr id="2" name="Title 1">
+            <a:extLst>
+              <a:ext uri="{FF2B5EF4-FFF2-40B4-BE49-F238E27FC236}">
+                <a16:creationId xmlns:a16="http://schemas.microsoft.com/office/drawing/2014/main" id="{FBC0B36E-E98E-4A96-A2A8-82EB69689E29}"/>
+              </a:ext>
+            </a:extLst>
+          </p:cNvPr>
+          <p:cNvSpPr>
+            <a:spLocks noGrp="1"/>
+          </p:cNvSpPr>
+          <p:nvPr>
+            <p:ph type="title"/>
+          </p:nvPr>
+        </p:nvSpPr>
+        <p:spPr/>
+        <p:txBody>
+          <a:bodyPr/>
+          <a:lstStyle/>
+          <a:p>
+            <a:r>
+              <a:rPr lang="es-419" dirty="0"/>
+              <a:t>Interfaz </a:t>
+            </a:r>
+            <a:r>
+              <a:rPr lang="es-419" dirty="0" err="1"/>
+              <a:t>gpio</a:t>
+            </a:r>
+            <a:r>
+              <a:rPr lang="es-419" dirty="0"/>
+              <a:t> hacia </a:t>
+            </a:r>
+            <a:r>
+              <a:rPr lang="es-419" dirty="0" err="1"/>
+              <a:t>hsm</a:t>
+            </a:r>
+            <a:endParaRPr lang="es-419" dirty="0"/>
+          </a:p>
+        </p:txBody>
+      </p:sp>
+      <p:pic>
+        <p:nvPicPr>
+          <p:cNvPr id="4" name="Content Placeholder 3">
+            <a:extLst>
+              <a:ext uri="{FF2B5EF4-FFF2-40B4-BE49-F238E27FC236}">
+                <a16:creationId xmlns:a16="http://schemas.microsoft.com/office/drawing/2014/main" id="{A465B12F-B331-46D3-82D7-7F6340CC621E}"/>
+              </a:ext>
+            </a:extLst>
+          </p:cNvPr>
+          <p:cNvPicPr>
+            <a:picLocks noGrp="1"/>
+          </p:cNvPicPr>
+          <p:nvPr>
+            <p:ph idx="1"/>
+          </p:nvPr>
+        </p:nvPicPr>
+        <p:blipFill>
+          <a:blip r:embed="rId2"/>
+          <a:stretch>
+            <a:fillRect/>
+          </a:stretch>
+        </p:blipFill>
+        <p:spPr>
+          <a:xfrm>
+            <a:off x="2719387" y="2143919"/>
+            <a:ext cx="6753225" cy="3714750"/>
+          </a:xfrm>
+          <a:prstGeom prst="rect">
+            <a:avLst/>
+          </a:prstGeom>
+        </p:spPr>
+      </p:pic>
+    </p:spTree>
+    <p:extLst>
+      <p:ext uri="{BB962C8B-B14F-4D97-AF65-F5344CB8AC3E}">
+        <p14:creationId xmlns:p14="http://schemas.microsoft.com/office/powerpoint/2010/main" val="3856469110"/>
+      </p:ext>
+    </p:extLst>
+  </p:cSld>
+  <p:clrMapOvr>
+    <a:masterClrMapping/>
+  </p:clrMapOvr>
+</p:sld>
+</file>
+
+<file path=ppt/slides/slide18.xml><?xml version="1.0" encoding="utf-8"?>
+<p:sld xmlns:a="http://schemas.openxmlformats.org/drawingml/2006/main" xmlns:r="http://schemas.openxmlformats.org/officeDocument/2006/relationships" xmlns:p="http://schemas.openxmlformats.org/presentationml/2006/main">
+  <p:cSld>
+    <p:spTree>
+      <p:nvGrpSpPr>
+        <p:cNvPr id="1" name=""/>
+        <p:cNvGrpSpPr/>
+        <p:nvPr/>
+      </p:nvGrpSpPr>
+      <p:grpSpPr>
+        <a:xfrm>
+          <a:off x="0" y="0"/>
+          <a:ext cx="0" cy="0"/>
+          <a:chOff x="0" y="0"/>
+          <a:chExt cx="0" cy="0"/>
+        </a:xfrm>
+      </p:grpSpPr>
+      <p:sp>
+        <p:nvSpPr>
+          <p:cNvPr id="2" name="Title 1">
+            <a:extLst>
+              <a:ext uri="{FF2B5EF4-FFF2-40B4-BE49-F238E27FC236}">
+                <a16:creationId xmlns:a16="http://schemas.microsoft.com/office/drawing/2014/main" id="{D635E536-45BE-4557-BB0C-B7C600867560}"/>
+              </a:ext>
+            </a:extLst>
+          </p:cNvPr>
+          <p:cNvSpPr>
+            <a:spLocks noGrp="1"/>
+          </p:cNvSpPr>
+          <p:nvPr>
+            <p:ph type="title"/>
+          </p:nvPr>
+        </p:nvSpPr>
+        <p:spPr/>
+        <p:txBody>
+          <a:bodyPr/>
+          <a:lstStyle/>
+          <a:p>
+            <a:r>
+              <a:rPr lang="es-419" dirty="0"/>
+              <a:t>Interfaz </a:t>
+            </a:r>
+            <a:r>
+              <a:rPr lang="es-419" dirty="0" err="1"/>
+              <a:t>gpio</a:t>
+            </a:r>
+            <a:r>
+              <a:rPr lang="es-419" dirty="0"/>
+              <a:t> hacia </a:t>
+            </a:r>
+            <a:r>
+              <a:rPr lang="es-419" dirty="0" err="1"/>
+              <a:t>hsm</a:t>
+            </a:r>
+            <a:endParaRPr lang="es-419" dirty="0"/>
+          </a:p>
+        </p:txBody>
+      </p:sp>
+      <p:pic>
+        <p:nvPicPr>
+          <p:cNvPr id="5" name="Picture 4">
+            <a:extLst>
+              <a:ext uri="{FF2B5EF4-FFF2-40B4-BE49-F238E27FC236}">
+                <a16:creationId xmlns:a16="http://schemas.microsoft.com/office/drawing/2014/main" id="{D06B09FD-7540-4A71-AE1C-701095752EEA}"/>
+              </a:ext>
+            </a:extLst>
+          </p:cNvPr>
+          <p:cNvPicPr>
+            <a:picLocks noChangeAspect="1"/>
+          </p:cNvPicPr>
+          <p:nvPr/>
+        </p:nvPicPr>
+        <p:blipFill>
+          <a:blip r:embed="rId2"/>
+          <a:stretch>
+            <a:fillRect/>
+          </a:stretch>
+        </p:blipFill>
+        <p:spPr>
+          <a:xfrm>
+            <a:off x="3629320" y="1679023"/>
+            <a:ext cx="5442555" cy="5077343"/>
+          </a:xfrm>
+          <a:prstGeom prst="rect">
+            <a:avLst/>
+          </a:prstGeom>
+        </p:spPr>
+      </p:pic>
+    </p:spTree>
+    <p:extLst>
+      <p:ext uri="{BB962C8B-B14F-4D97-AF65-F5344CB8AC3E}">
+        <p14:creationId xmlns:p14="http://schemas.microsoft.com/office/powerpoint/2010/main" val="2121061766"/>
+      </p:ext>
+    </p:extLst>
+  </p:cSld>
+  <p:clrMapOvr>
+    <a:masterClrMapping/>
+  </p:clrMapOvr>
+</p:sld>
+</file>
+
+<file path=ppt/slides/slide19.xml><?xml version="1.0" encoding="utf-8"?>
+<p:sld xmlns:a="http://schemas.openxmlformats.org/drawingml/2006/main" xmlns:r="http://schemas.openxmlformats.org/officeDocument/2006/relationships" xmlns:p="http://schemas.openxmlformats.org/presentationml/2006/main">
+  <p:cSld>
+    <p:spTree>
+      <p:nvGrpSpPr>
+        <p:cNvPr id="1" name=""/>
+        <p:cNvGrpSpPr/>
+        <p:nvPr/>
+      </p:nvGrpSpPr>
+      <p:grpSpPr>
+        <a:xfrm>
+          <a:off x="0" y="0"/>
+          <a:ext cx="0" cy="0"/>
+          <a:chOff x="0" y="0"/>
+          <a:chExt cx="0" cy="0"/>
+        </a:xfrm>
+      </p:grpSpPr>
+      <p:sp>
+        <p:nvSpPr>
+          <p:cNvPr id="2" name="Title 1">
+            <a:extLst>
+              <a:ext uri="{FF2B5EF4-FFF2-40B4-BE49-F238E27FC236}">
+                <a16:creationId xmlns:a16="http://schemas.microsoft.com/office/drawing/2014/main" id="{1A6E4EB7-5493-4C77-8192-8F80DAE2FA5D}"/>
+              </a:ext>
+            </a:extLst>
+          </p:cNvPr>
+          <p:cNvSpPr>
+            <a:spLocks noGrp="1"/>
+          </p:cNvSpPr>
+          <p:nvPr>
+            <p:ph type="title"/>
+          </p:nvPr>
+        </p:nvSpPr>
+        <p:spPr/>
+        <p:txBody>
+          <a:bodyPr/>
+          <a:lstStyle/>
+          <a:p>
+            <a:r>
+              <a:rPr lang="es-419" dirty="0" err="1"/>
+              <a:t>hsm</a:t>
+            </a:r>
+            <a:endParaRPr lang="es-419" dirty="0"/>
+          </a:p>
+        </p:txBody>
+      </p:sp>
+      <p:sp>
+        <p:nvSpPr>
+          <p:cNvPr id="3" name="Content Placeholder 2">
+            <a:extLst>
+              <a:ext uri="{FF2B5EF4-FFF2-40B4-BE49-F238E27FC236}">
+                <a16:creationId xmlns:a16="http://schemas.microsoft.com/office/drawing/2014/main" id="{AA71B292-B5CE-4A4A-A286-46B8B42EF0AF}"/>
+              </a:ext>
+            </a:extLst>
+          </p:cNvPr>
+          <p:cNvSpPr>
+            <a:spLocks noGrp="1"/>
+          </p:cNvSpPr>
+          <p:nvPr>
+            <p:ph idx="1"/>
+          </p:nvPr>
+        </p:nvSpPr>
+        <p:spPr/>
+        <p:txBody>
+          <a:bodyPr>
+            <a:normAutofit lnSpcReduction="10000"/>
+          </a:bodyPr>
+          <a:lstStyle/>
+          <a:p>
+            <a:r>
+              <a:rPr lang="es-419" dirty="0"/>
+              <a:t>Propuesta </a:t>
+            </a:r>
+          </a:p>
+          <a:p>
+            <a:endParaRPr lang="es-419" dirty="0"/>
+          </a:p>
+          <a:p>
+            <a:r>
+              <a:rPr lang="es-419" dirty="0"/>
+              <a:t>Aplicar una operación </a:t>
+            </a:r>
+            <a:r>
+              <a:rPr lang="es-419" dirty="0" err="1"/>
+              <a:t>xor</a:t>
+            </a:r>
+            <a:r>
+              <a:rPr lang="es-419" dirty="0"/>
+              <a:t> (cifrado más básico) a todos los bytes de la entrada desde la aplicación </a:t>
+            </a:r>
+            <a:r>
+              <a:rPr lang="es-419" dirty="0" err="1"/>
+              <a:t>TkInter</a:t>
+            </a:r>
+            <a:r>
+              <a:rPr lang="es-419" dirty="0"/>
+              <a:t>.</a:t>
+            </a:r>
+          </a:p>
+          <a:p>
+            <a:endParaRPr lang="es-419" dirty="0"/>
+          </a:p>
+          <a:p>
+            <a:r>
+              <a:rPr lang="es-419" dirty="0"/>
+              <a:t>Llave = 11111111</a:t>
+            </a:r>
+          </a:p>
+          <a:p>
+            <a:r>
+              <a:rPr lang="es-419" dirty="0"/>
+              <a:t>Texto en claro = 10101010</a:t>
+            </a:r>
+          </a:p>
+          <a:p>
+            <a:r>
+              <a:rPr lang="es-419" dirty="0"/>
+              <a:t>Texto cifrado   = 01010101</a:t>
+            </a:r>
+          </a:p>
+          <a:p>
+            <a:r>
+              <a:rPr lang="es-419" dirty="0"/>
+              <a:t>Texto descifrado = 10101010</a:t>
+            </a:r>
+          </a:p>
+          <a:p>
+            <a:endParaRPr lang="es-419" dirty="0"/>
+          </a:p>
+        </p:txBody>
+      </p:sp>
+    </p:spTree>
+    <p:extLst>
+      <p:ext uri="{BB962C8B-B14F-4D97-AF65-F5344CB8AC3E}">
+        <p14:creationId xmlns:p14="http://schemas.microsoft.com/office/powerpoint/2010/main" val="3909943873"/>
+      </p:ext>
+    </p:extLst>
+  </p:cSld>
+  <p:clrMapOvr>
+    <a:masterClrMapping/>
+  </p:clrMapOvr>
+</p:sld>
+</file>
+
 <file path=ppt/slides/slide2.xml><?xml version="1.0" encoding="utf-8"?>
 <p:sld xmlns:a="http://schemas.openxmlformats.org/drawingml/2006/main" xmlns:r="http://schemas.openxmlformats.org/officeDocument/2006/relationships" xmlns:p="http://schemas.openxmlformats.org/presentationml/2006/main">
   <p:cSld>
@@ -3528,6 +4572,1034 @@
     <p:extLst>
       <p:ext uri="{BB962C8B-B14F-4D97-AF65-F5344CB8AC3E}">
         <p14:creationId xmlns:p14="http://schemas.microsoft.com/office/powerpoint/2010/main" val="33927505"/>
+      </p:ext>
+    </p:extLst>
+  </p:cSld>
+  <p:clrMapOvr>
+    <a:masterClrMapping/>
+  </p:clrMapOvr>
+</p:sld>
+</file>
+
+<file path=ppt/slides/slide20.xml><?xml version="1.0" encoding="utf-8"?>
+<p:sld xmlns:a="http://schemas.openxmlformats.org/drawingml/2006/main" xmlns:r="http://schemas.openxmlformats.org/officeDocument/2006/relationships" xmlns:p="http://schemas.openxmlformats.org/presentationml/2006/main">
+  <p:cSld>
+    <p:spTree>
+      <p:nvGrpSpPr>
+        <p:cNvPr id="1" name=""/>
+        <p:cNvGrpSpPr/>
+        <p:nvPr/>
+      </p:nvGrpSpPr>
+      <p:grpSpPr>
+        <a:xfrm>
+          <a:off x="0" y="0"/>
+          <a:ext cx="0" cy="0"/>
+          <a:chOff x="0" y="0"/>
+          <a:chExt cx="0" cy="0"/>
+        </a:xfrm>
+      </p:grpSpPr>
+      <p:sp>
+        <p:nvSpPr>
+          <p:cNvPr id="2" name="Title 1">
+            <a:extLst>
+              <a:ext uri="{FF2B5EF4-FFF2-40B4-BE49-F238E27FC236}">
+                <a16:creationId xmlns:a16="http://schemas.microsoft.com/office/drawing/2014/main" id="{0F248F2B-C4DE-425F-A63E-719BB20AA8CA}"/>
+              </a:ext>
+            </a:extLst>
+          </p:cNvPr>
+          <p:cNvSpPr>
+            <a:spLocks noGrp="1"/>
+          </p:cNvSpPr>
+          <p:nvPr>
+            <p:ph type="title"/>
+          </p:nvPr>
+        </p:nvSpPr>
+        <p:spPr/>
+        <p:txBody>
+          <a:bodyPr/>
+          <a:lstStyle/>
+          <a:p>
+            <a:r>
+              <a:rPr lang="es-419" dirty="0" err="1"/>
+              <a:t>Testbenches</a:t>
+            </a:r>
+            <a:endParaRPr lang="es-419" dirty="0"/>
+          </a:p>
+        </p:txBody>
+      </p:sp>
+      <p:sp>
+        <p:nvSpPr>
+          <p:cNvPr id="3" name="Content Placeholder 2">
+            <a:extLst>
+              <a:ext uri="{FF2B5EF4-FFF2-40B4-BE49-F238E27FC236}">
+                <a16:creationId xmlns:a16="http://schemas.microsoft.com/office/drawing/2014/main" id="{4C3D28FB-BF1B-442D-93DF-87C5E20B73D8}"/>
+              </a:ext>
+            </a:extLst>
+          </p:cNvPr>
+          <p:cNvSpPr>
+            <a:spLocks noGrp="1"/>
+          </p:cNvSpPr>
+          <p:nvPr>
+            <p:ph idx="1"/>
+          </p:nvPr>
+        </p:nvSpPr>
+        <p:spPr/>
+        <p:txBody>
+          <a:bodyPr/>
+          <a:lstStyle/>
+          <a:p>
+            <a:endParaRPr lang="es-419"/>
+          </a:p>
+        </p:txBody>
+      </p:sp>
+      <p:pic>
+        <p:nvPicPr>
+          <p:cNvPr id="4" name="Picture 3">
+            <a:extLst>
+              <a:ext uri="{FF2B5EF4-FFF2-40B4-BE49-F238E27FC236}">
+                <a16:creationId xmlns:a16="http://schemas.microsoft.com/office/drawing/2014/main" id="{20C2E8BA-E436-442A-87F2-9E94833BA54C}"/>
+              </a:ext>
+            </a:extLst>
+          </p:cNvPr>
+          <p:cNvPicPr>
+            <a:picLocks noChangeAspect="1"/>
+          </p:cNvPicPr>
+          <p:nvPr/>
+        </p:nvPicPr>
+        <p:blipFill>
+          <a:blip r:embed="rId2"/>
+          <a:stretch>
+            <a:fillRect/>
+          </a:stretch>
+        </p:blipFill>
+        <p:spPr>
+          <a:xfrm>
+            <a:off x="2470510" y="2205831"/>
+            <a:ext cx="6572250" cy="3590925"/>
+          </a:xfrm>
+          <a:prstGeom prst="rect">
+            <a:avLst/>
+          </a:prstGeom>
+        </p:spPr>
+      </p:pic>
+    </p:spTree>
+    <p:extLst>
+      <p:ext uri="{BB962C8B-B14F-4D97-AF65-F5344CB8AC3E}">
+        <p14:creationId xmlns:p14="http://schemas.microsoft.com/office/powerpoint/2010/main" val="523041242"/>
+      </p:ext>
+    </p:extLst>
+  </p:cSld>
+  <p:clrMapOvr>
+    <a:masterClrMapping/>
+  </p:clrMapOvr>
+</p:sld>
+</file>
+
+<file path=ppt/slides/slide21.xml><?xml version="1.0" encoding="utf-8"?>
+<p:sld xmlns:a="http://schemas.openxmlformats.org/drawingml/2006/main" xmlns:r="http://schemas.openxmlformats.org/officeDocument/2006/relationships" xmlns:p="http://schemas.openxmlformats.org/presentationml/2006/main">
+  <p:cSld>
+    <p:spTree>
+      <p:nvGrpSpPr>
+        <p:cNvPr id="1" name=""/>
+        <p:cNvGrpSpPr/>
+        <p:nvPr/>
+      </p:nvGrpSpPr>
+      <p:grpSpPr>
+        <a:xfrm>
+          <a:off x="0" y="0"/>
+          <a:ext cx="0" cy="0"/>
+          <a:chOff x="0" y="0"/>
+          <a:chExt cx="0" cy="0"/>
+        </a:xfrm>
+      </p:grpSpPr>
+      <p:sp>
+        <p:nvSpPr>
+          <p:cNvPr id="2" name="Title 1">
+            <a:extLst>
+              <a:ext uri="{FF2B5EF4-FFF2-40B4-BE49-F238E27FC236}">
+                <a16:creationId xmlns:a16="http://schemas.microsoft.com/office/drawing/2014/main" id="{0C98738B-5029-44AC-9B42-FF9C59B688E7}"/>
+              </a:ext>
+            </a:extLst>
+          </p:cNvPr>
+          <p:cNvSpPr>
+            <a:spLocks noGrp="1"/>
+          </p:cNvSpPr>
+          <p:nvPr>
+            <p:ph type="title"/>
+          </p:nvPr>
+        </p:nvSpPr>
+        <p:spPr/>
+        <p:txBody>
+          <a:bodyPr/>
+          <a:lstStyle/>
+          <a:p>
+            <a:r>
+              <a:rPr lang="es-419" dirty="0" err="1"/>
+              <a:t>Testbenches</a:t>
+            </a:r>
+            <a:endParaRPr lang="es-419" dirty="0"/>
+          </a:p>
+        </p:txBody>
+      </p:sp>
+      <p:pic>
+        <p:nvPicPr>
+          <p:cNvPr id="4" name="Picture 3">
+            <a:extLst>
+              <a:ext uri="{FF2B5EF4-FFF2-40B4-BE49-F238E27FC236}">
+                <a16:creationId xmlns:a16="http://schemas.microsoft.com/office/drawing/2014/main" id="{A23A5694-84B2-4125-8937-C7438EC50A6F}"/>
+              </a:ext>
+            </a:extLst>
+          </p:cNvPr>
+          <p:cNvPicPr>
+            <a:picLocks noChangeAspect="1"/>
+          </p:cNvPicPr>
+          <p:nvPr/>
+        </p:nvPicPr>
+        <p:blipFill>
+          <a:blip r:embed="rId2"/>
+          <a:stretch>
+            <a:fillRect/>
+          </a:stretch>
+        </p:blipFill>
+        <p:spPr>
+          <a:xfrm>
+            <a:off x="3455954" y="1776413"/>
+            <a:ext cx="4676775" cy="4400550"/>
+          </a:xfrm>
+          <a:prstGeom prst="rect">
+            <a:avLst/>
+          </a:prstGeom>
+        </p:spPr>
+      </p:pic>
+    </p:spTree>
+    <p:extLst>
+      <p:ext uri="{BB962C8B-B14F-4D97-AF65-F5344CB8AC3E}">
+        <p14:creationId xmlns:p14="http://schemas.microsoft.com/office/powerpoint/2010/main" val="1801715013"/>
+      </p:ext>
+    </p:extLst>
+  </p:cSld>
+  <p:clrMapOvr>
+    <a:masterClrMapping/>
+  </p:clrMapOvr>
+</p:sld>
+</file>
+
+<file path=ppt/slides/slide22.xml><?xml version="1.0" encoding="utf-8"?>
+<p:sld xmlns:a="http://schemas.openxmlformats.org/drawingml/2006/main" xmlns:r="http://schemas.openxmlformats.org/officeDocument/2006/relationships" xmlns:p="http://schemas.openxmlformats.org/presentationml/2006/main">
+  <p:cSld>
+    <p:spTree>
+      <p:nvGrpSpPr>
+        <p:cNvPr id="1" name=""/>
+        <p:cNvGrpSpPr/>
+        <p:nvPr/>
+      </p:nvGrpSpPr>
+      <p:grpSpPr>
+        <a:xfrm>
+          <a:off x="0" y="0"/>
+          <a:ext cx="0" cy="0"/>
+          <a:chOff x="0" y="0"/>
+          <a:chExt cx="0" cy="0"/>
+        </a:xfrm>
+      </p:grpSpPr>
+      <p:sp>
+        <p:nvSpPr>
+          <p:cNvPr id="2" name="Title 1">
+            <a:extLst>
+              <a:ext uri="{FF2B5EF4-FFF2-40B4-BE49-F238E27FC236}">
+                <a16:creationId xmlns:a16="http://schemas.microsoft.com/office/drawing/2014/main" id="{A318D9D5-EAA4-4D68-A1D3-DA38BA59986E}"/>
+              </a:ext>
+            </a:extLst>
+          </p:cNvPr>
+          <p:cNvSpPr>
+            <a:spLocks noGrp="1"/>
+          </p:cNvSpPr>
+          <p:nvPr>
+            <p:ph type="title"/>
+          </p:nvPr>
+        </p:nvSpPr>
+        <p:spPr/>
+        <p:txBody>
+          <a:bodyPr/>
+          <a:lstStyle/>
+          <a:p>
+            <a:r>
+              <a:rPr lang="es-419" dirty="0"/>
+              <a:t>Agenda</a:t>
+            </a:r>
+          </a:p>
+        </p:txBody>
+      </p:sp>
+      <p:sp>
+        <p:nvSpPr>
+          <p:cNvPr id="3" name="Content Placeholder 2">
+            <a:extLst>
+              <a:ext uri="{FF2B5EF4-FFF2-40B4-BE49-F238E27FC236}">
+                <a16:creationId xmlns:a16="http://schemas.microsoft.com/office/drawing/2014/main" id="{9194A4ED-3258-40F7-92CE-47E1C478286D}"/>
+              </a:ext>
+            </a:extLst>
+          </p:cNvPr>
+          <p:cNvSpPr>
+            <a:spLocks noGrp="1"/>
+          </p:cNvSpPr>
+          <p:nvPr>
+            <p:ph idx="1"/>
+          </p:nvPr>
+        </p:nvSpPr>
+        <p:spPr/>
+        <p:txBody>
+          <a:bodyPr/>
+          <a:lstStyle/>
+          <a:p>
+            <a:r>
+              <a:rPr lang="es-419" dirty="0"/>
+              <a:t>Integración de lenguajes </a:t>
+            </a:r>
+          </a:p>
+          <a:p>
+            <a:r>
+              <a:rPr lang="es-419" dirty="0"/>
+              <a:t>Interfaces</a:t>
+            </a:r>
+          </a:p>
+          <a:p>
+            <a:r>
+              <a:rPr lang="es-419" dirty="0"/>
+              <a:t>Programación permanente FPGA</a:t>
+            </a:r>
+          </a:p>
+          <a:p>
+            <a:r>
+              <a:rPr lang="es-419" dirty="0"/>
+              <a:t>Pruebas unitarias (scripting y simulación)</a:t>
+            </a:r>
+          </a:p>
+          <a:p>
+            <a:r>
+              <a:rPr lang="es-419" dirty="0"/>
+              <a:t>Integración</a:t>
+            </a:r>
+          </a:p>
+          <a:p>
+            <a:r>
+              <a:rPr lang="es-419" dirty="0"/>
+              <a:t>Pruebas de integración</a:t>
+            </a:r>
+          </a:p>
+          <a:p>
+            <a:endParaRPr lang="es-419" dirty="0"/>
+          </a:p>
+        </p:txBody>
+      </p:sp>
+    </p:spTree>
+    <p:extLst>
+      <p:ext uri="{BB962C8B-B14F-4D97-AF65-F5344CB8AC3E}">
+        <p14:creationId xmlns:p14="http://schemas.microsoft.com/office/powerpoint/2010/main" val="1331283329"/>
+      </p:ext>
+    </p:extLst>
+  </p:cSld>
+  <p:clrMapOvr>
+    <a:masterClrMapping/>
+  </p:clrMapOvr>
+</p:sld>
+</file>
+
+<file path=ppt/slides/slide23.xml><?xml version="1.0" encoding="utf-8"?>
+<p:sld xmlns:a="http://schemas.openxmlformats.org/drawingml/2006/main" xmlns:r="http://schemas.openxmlformats.org/officeDocument/2006/relationships" xmlns:p="http://schemas.openxmlformats.org/presentationml/2006/main">
+  <p:cSld>
+    <p:spTree>
+      <p:nvGrpSpPr>
+        <p:cNvPr id="1" name=""/>
+        <p:cNvGrpSpPr/>
+        <p:nvPr/>
+      </p:nvGrpSpPr>
+      <p:grpSpPr>
+        <a:xfrm>
+          <a:off x="0" y="0"/>
+          <a:ext cx="0" cy="0"/>
+          <a:chOff x="0" y="0"/>
+          <a:chExt cx="0" cy="0"/>
+        </a:xfrm>
+      </p:grpSpPr>
+      <p:sp>
+        <p:nvSpPr>
+          <p:cNvPr id="2" name="Title 1">
+            <a:extLst>
+              <a:ext uri="{FF2B5EF4-FFF2-40B4-BE49-F238E27FC236}">
+                <a16:creationId xmlns:a16="http://schemas.microsoft.com/office/drawing/2014/main" id="{7688E051-BFC0-495F-AA06-3EB7A38F7B28}"/>
+              </a:ext>
+            </a:extLst>
+          </p:cNvPr>
+          <p:cNvSpPr>
+            <a:spLocks noGrp="1"/>
+          </p:cNvSpPr>
+          <p:nvPr>
+            <p:ph type="title"/>
+          </p:nvPr>
+        </p:nvSpPr>
+        <p:spPr/>
+        <p:txBody>
+          <a:bodyPr/>
+          <a:lstStyle/>
+          <a:p>
+            <a:r>
+              <a:rPr lang="es-419" dirty="0"/>
+              <a:t>Interfaces</a:t>
+            </a:r>
+          </a:p>
+        </p:txBody>
+      </p:sp>
+      <p:sp>
+        <p:nvSpPr>
+          <p:cNvPr id="3" name="Content Placeholder 2">
+            <a:extLst>
+              <a:ext uri="{FF2B5EF4-FFF2-40B4-BE49-F238E27FC236}">
+                <a16:creationId xmlns:a16="http://schemas.microsoft.com/office/drawing/2014/main" id="{FF4C5885-4515-4C03-8509-31D919CF9803}"/>
+              </a:ext>
+            </a:extLst>
+          </p:cNvPr>
+          <p:cNvSpPr>
+            <a:spLocks noGrp="1"/>
+          </p:cNvSpPr>
+          <p:nvPr>
+            <p:ph idx="1"/>
+          </p:nvPr>
+        </p:nvSpPr>
+        <p:spPr/>
+        <p:txBody>
+          <a:bodyPr/>
+          <a:lstStyle/>
+          <a:p>
+            <a:endParaRPr lang="es-419"/>
+          </a:p>
+        </p:txBody>
+      </p:sp>
+      <p:pic>
+        <p:nvPicPr>
+          <p:cNvPr id="4" name="Picture 3">
+            <a:extLst>
+              <a:ext uri="{FF2B5EF4-FFF2-40B4-BE49-F238E27FC236}">
+                <a16:creationId xmlns:a16="http://schemas.microsoft.com/office/drawing/2014/main" id="{714A176C-F871-4F11-9872-12ACC4B0B0C1}"/>
+              </a:ext>
+            </a:extLst>
+          </p:cNvPr>
+          <p:cNvPicPr>
+            <a:picLocks noChangeAspect="1"/>
+          </p:cNvPicPr>
+          <p:nvPr/>
+        </p:nvPicPr>
+        <p:blipFill>
+          <a:blip r:embed="rId2"/>
+          <a:stretch>
+            <a:fillRect/>
+          </a:stretch>
+        </p:blipFill>
+        <p:spPr>
+          <a:xfrm>
+            <a:off x="2403834" y="1960245"/>
+            <a:ext cx="7629819" cy="4684236"/>
+          </a:xfrm>
+          <a:prstGeom prst="rect">
+            <a:avLst/>
+          </a:prstGeom>
+        </p:spPr>
+      </p:pic>
+    </p:spTree>
+    <p:extLst>
+      <p:ext uri="{BB962C8B-B14F-4D97-AF65-F5344CB8AC3E}">
+        <p14:creationId xmlns:p14="http://schemas.microsoft.com/office/powerpoint/2010/main" val="3731395285"/>
+      </p:ext>
+    </p:extLst>
+  </p:cSld>
+  <p:clrMapOvr>
+    <a:masterClrMapping/>
+  </p:clrMapOvr>
+</p:sld>
+</file>
+
+<file path=ppt/slides/slide24.xml><?xml version="1.0" encoding="utf-8"?>
+<p:sld xmlns:a="http://schemas.openxmlformats.org/drawingml/2006/main" xmlns:r="http://schemas.openxmlformats.org/officeDocument/2006/relationships" xmlns:p="http://schemas.openxmlformats.org/presentationml/2006/main">
+  <p:cSld>
+    <p:spTree>
+      <p:nvGrpSpPr>
+        <p:cNvPr id="1" name=""/>
+        <p:cNvGrpSpPr/>
+        <p:nvPr/>
+      </p:nvGrpSpPr>
+      <p:grpSpPr>
+        <a:xfrm>
+          <a:off x="0" y="0"/>
+          <a:ext cx="0" cy="0"/>
+          <a:chOff x="0" y="0"/>
+          <a:chExt cx="0" cy="0"/>
+        </a:xfrm>
+      </p:grpSpPr>
+      <p:sp>
+        <p:nvSpPr>
+          <p:cNvPr id="2" name="Title 1">
+            <a:extLst>
+              <a:ext uri="{FF2B5EF4-FFF2-40B4-BE49-F238E27FC236}">
+                <a16:creationId xmlns:a16="http://schemas.microsoft.com/office/drawing/2014/main" id="{05CF82D8-ABA8-4B07-B31B-C690040072DE}"/>
+              </a:ext>
+            </a:extLst>
+          </p:cNvPr>
+          <p:cNvSpPr>
+            <a:spLocks noGrp="1"/>
+          </p:cNvSpPr>
+          <p:nvPr>
+            <p:ph type="title"/>
+          </p:nvPr>
+        </p:nvSpPr>
+        <p:spPr/>
+        <p:txBody>
+          <a:bodyPr/>
+          <a:lstStyle/>
+          <a:p>
+            <a:r>
+              <a:rPr lang="es-419" dirty="0"/>
+              <a:t>Integración de lenguajes </a:t>
+            </a:r>
+          </a:p>
+        </p:txBody>
+      </p:sp>
+      <p:sp>
+        <p:nvSpPr>
+          <p:cNvPr id="3" name="Content Placeholder 2">
+            <a:extLst>
+              <a:ext uri="{FF2B5EF4-FFF2-40B4-BE49-F238E27FC236}">
+                <a16:creationId xmlns:a16="http://schemas.microsoft.com/office/drawing/2014/main" id="{9048F6D4-553C-4B38-8C35-D3709479CDE9}"/>
+              </a:ext>
+            </a:extLst>
+          </p:cNvPr>
+          <p:cNvSpPr>
+            <a:spLocks noGrp="1"/>
+          </p:cNvSpPr>
+          <p:nvPr>
+            <p:ph idx="1"/>
+          </p:nvPr>
+        </p:nvSpPr>
+        <p:spPr/>
+        <p:txBody>
+          <a:bodyPr/>
+          <a:lstStyle/>
+          <a:p>
+            <a:endParaRPr lang="es-419"/>
+          </a:p>
+        </p:txBody>
+      </p:sp>
+      <p:pic>
+        <p:nvPicPr>
+          <p:cNvPr id="4" name="Picture 3">
+            <a:extLst>
+              <a:ext uri="{FF2B5EF4-FFF2-40B4-BE49-F238E27FC236}">
+                <a16:creationId xmlns:a16="http://schemas.microsoft.com/office/drawing/2014/main" id="{B990C92D-5309-4690-B22D-3F8A944808FF}"/>
+              </a:ext>
+            </a:extLst>
+          </p:cNvPr>
+          <p:cNvPicPr>
+            <a:picLocks noChangeAspect="1"/>
+          </p:cNvPicPr>
+          <p:nvPr/>
+        </p:nvPicPr>
+        <p:blipFill>
+          <a:blip r:embed="rId2"/>
+          <a:stretch>
+            <a:fillRect/>
+          </a:stretch>
+        </p:blipFill>
+        <p:spPr>
+          <a:xfrm>
+            <a:off x="838200" y="1896269"/>
+            <a:ext cx="7543800" cy="2105025"/>
+          </a:xfrm>
+          <a:prstGeom prst="rect">
+            <a:avLst/>
+          </a:prstGeom>
+        </p:spPr>
+      </p:pic>
+    </p:spTree>
+    <p:extLst>
+      <p:ext uri="{BB962C8B-B14F-4D97-AF65-F5344CB8AC3E}">
+        <p14:creationId xmlns:p14="http://schemas.microsoft.com/office/powerpoint/2010/main" val="764171000"/>
+      </p:ext>
+    </p:extLst>
+  </p:cSld>
+  <p:clrMapOvr>
+    <a:masterClrMapping/>
+  </p:clrMapOvr>
+</p:sld>
+</file>
+
+<file path=ppt/slides/slide25.xml><?xml version="1.0" encoding="utf-8"?>
+<p:sld xmlns:a="http://schemas.openxmlformats.org/drawingml/2006/main" xmlns:r="http://schemas.openxmlformats.org/officeDocument/2006/relationships" xmlns:p="http://schemas.openxmlformats.org/presentationml/2006/main">
+  <p:cSld>
+    <p:spTree>
+      <p:nvGrpSpPr>
+        <p:cNvPr id="1" name=""/>
+        <p:cNvGrpSpPr/>
+        <p:nvPr/>
+      </p:nvGrpSpPr>
+      <p:grpSpPr>
+        <a:xfrm>
+          <a:off x="0" y="0"/>
+          <a:ext cx="0" cy="0"/>
+          <a:chOff x="0" y="0"/>
+          <a:chExt cx="0" cy="0"/>
+        </a:xfrm>
+      </p:grpSpPr>
+      <p:sp>
+        <p:nvSpPr>
+          <p:cNvPr id="2" name="Title 1">
+            <a:extLst>
+              <a:ext uri="{FF2B5EF4-FFF2-40B4-BE49-F238E27FC236}">
+                <a16:creationId xmlns:a16="http://schemas.microsoft.com/office/drawing/2014/main" id="{9D43404F-52BB-46A4-A6BA-888DB0EBD703}"/>
+              </a:ext>
+            </a:extLst>
+          </p:cNvPr>
+          <p:cNvSpPr>
+            <a:spLocks noGrp="1"/>
+          </p:cNvSpPr>
+          <p:nvPr>
+            <p:ph type="title"/>
+          </p:nvPr>
+        </p:nvSpPr>
+        <p:spPr/>
+        <p:txBody>
+          <a:bodyPr/>
+          <a:lstStyle/>
+          <a:p>
+            <a:r>
+              <a:rPr lang="es-419" dirty="0"/>
+              <a:t>Programación permanente</a:t>
+            </a:r>
+          </a:p>
+        </p:txBody>
+      </p:sp>
+      <p:sp>
+        <p:nvSpPr>
+          <p:cNvPr id="3" name="Content Placeholder 2">
+            <a:extLst>
+              <a:ext uri="{FF2B5EF4-FFF2-40B4-BE49-F238E27FC236}">
+                <a16:creationId xmlns:a16="http://schemas.microsoft.com/office/drawing/2014/main" id="{90D1EB07-39C6-4C7F-8A3F-5901EDB7AAE6}"/>
+              </a:ext>
+            </a:extLst>
+          </p:cNvPr>
+          <p:cNvSpPr>
+            <a:spLocks noGrp="1"/>
+          </p:cNvSpPr>
+          <p:nvPr>
+            <p:ph idx="1"/>
+          </p:nvPr>
+        </p:nvSpPr>
+        <p:spPr/>
+        <p:txBody>
+          <a:bodyPr/>
+          <a:lstStyle/>
+          <a:p>
+            <a:endParaRPr lang="es-419" dirty="0"/>
+          </a:p>
+        </p:txBody>
+      </p:sp>
+      <p:pic>
+        <p:nvPicPr>
+          <p:cNvPr id="4" name="Picture 3">
+            <a:extLst>
+              <a:ext uri="{FF2B5EF4-FFF2-40B4-BE49-F238E27FC236}">
+                <a16:creationId xmlns:a16="http://schemas.microsoft.com/office/drawing/2014/main" id="{95F70F97-0B19-4606-83C8-57AC0875E3CB}"/>
+              </a:ext>
+            </a:extLst>
+          </p:cNvPr>
+          <p:cNvPicPr>
+            <a:picLocks noChangeAspect="1"/>
+          </p:cNvPicPr>
+          <p:nvPr/>
+        </p:nvPicPr>
+        <p:blipFill>
+          <a:blip r:embed="rId2"/>
+          <a:stretch>
+            <a:fillRect/>
+          </a:stretch>
+        </p:blipFill>
+        <p:spPr>
+          <a:xfrm>
+            <a:off x="1278215" y="1584930"/>
+            <a:ext cx="9277350" cy="3876675"/>
+          </a:xfrm>
+          <a:prstGeom prst="rect">
+            <a:avLst/>
+          </a:prstGeom>
+        </p:spPr>
+      </p:pic>
+    </p:spTree>
+    <p:extLst>
+      <p:ext uri="{BB962C8B-B14F-4D97-AF65-F5344CB8AC3E}">
+        <p14:creationId xmlns:p14="http://schemas.microsoft.com/office/powerpoint/2010/main" val="848811684"/>
+      </p:ext>
+    </p:extLst>
+  </p:cSld>
+  <p:clrMapOvr>
+    <a:masterClrMapping/>
+  </p:clrMapOvr>
+</p:sld>
+</file>
+
+<file path=ppt/slides/slide26.xml><?xml version="1.0" encoding="utf-8"?>
+<p:sld xmlns:a="http://schemas.openxmlformats.org/drawingml/2006/main" xmlns:r="http://schemas.openxmlformats.org/officeDocument/2006/relationships" xmlns:p="http://schemas.openxmlformats.org/presentationml/2006/main">
+  <p:cSld>
+    <p:spTree>
+      <p:nvGrpSpPr>
+        <p:cNvPr id="1" name=""/>
+        <p:cNvGrpSpPr/>
+        <p:nvPr/>
+      </p:nvGrpSpPr>
+      <p:grpSpPr>
+        <a:xfrm>
+          <a:off x="0" y="0"/>
+          <a:ext cx="0" cy="0"/>
+          <a:chOff x="0" y="0"/>
+          <a:chExt cx="0" cy="0"/>
+        </a:xfrm>
+      </p:grpSpPr>
+      <p:sp>
+        <p:nvSpPr>
+          <p:cNvPr id="2" name="Title 1">
+            <a:extLst>
+              <a:ext uri="{FF2B5EF4-FFF2-40B4-BE49-F238E27FC236}">
+                <a16:creationId xmlns:a16="http://schemas.microsoft.com/office/drawing/2014/main" id="{6A877619-FF54-4241-A060-9512D53C6E93}"/>
+              </a:ext>
+            </a:extLst>
+          </p:cNvPr>
+          <p:cNvSpPr>
+            <a:spLocks noGrp="1"/>
+          </p:cNvSpPr>
+          <p:nvPr>
+            <p:ph type="title"/>
+          </p:nvPr>
+        </p:nvSpPr>
+        <p:spPr/>
+        <p:txBody>
+          <a:bodyPr/>
+          <a:lstStyle/>
+          <a:p>
+            <a:r>
+              <a:rPr lang="es-419" dirty="0"/>
+              <a:t>Pruebas unitarias (</a:t>
+            </a:r>
+            <a:r>
+              <a:rPr lang="es-419" dirty="0" err="1"/>
+              <a:t>hw</a:t>
+            </a:r>
+            <a:r>
+              <a:rPr lang="es-419" dirty="0"/>
+              <a:t> y </a:t>
+            </a:r>
+            <a:r>
+              <a:rPr lang="es-419" dirty="0" err="1"/>
+              <a:t>sw</a:t>
+            </a:r>
+            <a:r>
+              <a:rPr lang="es-419" dirty="0"/>
+              <a:t>)</a:t>
+            </a:r>
+          </a:p>
+        </p:txBody>
+      </p:sp>
+      <p:sp>
+        <p:nvSpPr>
+          <p:cNvPr id="3" name="Content Placeholder 2">
+            <a:extLst>
+              <a:ext uri="{FF2B5EF4-FFF2-40B4-BE49-F238E27FC236}">
+                <a16:creationId xmlns:a16="http://schemas.microsoft.com/office/drawing/2014/main" id="{FE120D4B-D173-4250-8574-6FCAE740E285}"/>
+              </a:ext>
+            </a:extLst>
+          </p:cNvPr>
+          <p:cNvSpPr>
+            <a:spLocks noGrp="1"/>
+          </p:cNvSpPr>
+          <p:nvPr>
+            <p:ph idx="1"/>
+          </p:nvPr>
+        </p:nvSpPr>
+        <p:spPr/>
+        <p:txBody>
+          <a:bodyPr/>
+          <a:lstStyle/>
+          <a:p>
+            <a:r>
+              <a:rPr lang="es-419" dirty="0"/>
+              <a:t>Demo</a:t>
+            </a:r>
+          </a:p>
+        </p:txBody>
+      </p:sp>
+      <p:pic>
+        <p:nvPicPr>
+          <p:cNvPr id="4" name="Picture 3">
+            <a:extLst>
+              <a:ext uri="{FF2B5EF4-FFF2-40B4-BE49-F238E27FC236}">
+                <a16:creationId xmlns:a16="http://schemas.microsoft.com/office/drawing/2014/main" id="{5777540C-4FC5-4358-BE38-265E3D2844A4}"/>
+              </a:ext>
+            </a:extLst>
+          </p:cNvPr>
+          <p:cNvPicPr>
+            <a:picLocks noChangeAspect="1"/>
+          </p:cNvPicPr>
+          <p:nvPr/>
+        </p:nvPicPr>
+        <p:blipFill>
+          <a:blip r:embed="rId2"/>
+          <a:stretch>
+            <a:fillRect/>
+          </a:stretch>
+        </p:blipFill>
+        <p:spPr>
+          <a:xfrm>
+            <a:off x="955544" y="2554762"/>
+            <a:ext cx="4210050" cy="1352550"/>
+          </a:xfrm>
+          <a:prstGeom prst="rect">
+            <a:avLst/>
+          </a:prstGeom>
+        </p:spPr>
+      </p:pic>
+      <p:pic>
+        <p:nvPicPr>
+          <p:cNvPr id="5" name="Picture 4">
+            <a:extLst>
+              <a:ext uri="{FF2B5EF4-FFF2-40B4-BE49-F238E27FC236}">
+                <a16:creationId xmlns:a16="http://schemas.microsoft.com/office/drawing/2014/main" id="{BC45A50C-7896-4FD7-B206-BB3D29D90021}"/>
+              </a:ext>
+            </a:extLst>
+          </p:cNvPr>
+          <p:cNvPicPr>
+            <a:picLocks noChangeAspect="1"/>
+          </p:cNvPicPr>
+          <p:nvPr/>
+        </p:nvPicPr>
+        <p:blipFill>
+          <a:blip r:embed="rId3"/>
+          <a:stretch>
+            <a:fillRect/>
+          </a:stretch>
+        </p:blipFill>
+        <p:spPr>
+          <a:xfrm>
+            <a:off x="730577" y="4274074"/>
+            <a:ext cx="7620000" cy="2476500"/>
+          </a:xfrm>
+          <a:prstGeom prst="rect">
+            <a:avLst/>
+          </a:prstGeom>
+        </p:spPr>
+      </p:pic>
+    </p:spTree>
+    <p:extLst>
+      <p:ext uri="{BB962C8B-B14F-4D97-AF65-F5344CB8AC3E}">
+        <p14:creationId xmlns:p14="http://schemas.microsoft.com/office/powerpoint/2010/main" val="2634751937"/>
+      </p:ext>
+    </p:extLst>
+  </p:cSld>
+  <p:clrMapOvr>
+    <a:masterClrMapping/>
+  </p:clrMapOvr>
+</p:sld>
+</file>
+
+<file path=ppt/slides/slide27.xml><?xml version="1.0" encoding="utf-8"?>
+<p:sld xmlns:a="http://schemas.openxmlformats.org/drawingml/2006/main" xmlns:r="http://schemas.openxmlformats.org/officeDocument/2006/relationships" xmlns:p="http://schemas.openxmlformats.org/presentationml/2006/main">
+  <p:cSld>
+    <p:spTree>
+      <p:nvGrpSpPr>
+        <p:cNvPr id="1" name=""/>
+        <p:cNvGrpSpPr/>
+        <p:nvPr/>
+      </p:nvGrpSpPr>
+      <p:grpSpPr>
+        <a:xfrm>
+          <a:off x="0" y="0"/>
+          <a:ext cx="0" cy="0"/>
+          <a:chOff x="0" y="0"/>
+          <a:chExt cx="0" cy="0"/>
+        </a:xfrm>
+      </p:grpSpPr>
+      <p:sp>
+        <p:nvSpPr>
+          <p:cNvPr id="2" name="Title 1">
+            <a:extLst>
+              <a:ext uri="{FF2B5EF4-FFF2-40B4-BE49-F238E27FC236}">
+                <a16:creationId xmlns:a16="http://schemas.microsoft.com/office/drawing/2014/main" id="{9184BA87-4AED-427B-992D-44BA6A8CA22B}"/>
+              </a:ext>
+            </a:extLst>
+          </p:cNvPr>
+          <p:cNvSpPr>
+            <a:spLocks noGrp="1"/>
+          </p:cNvSpPr>
+          <p:nvPr>
+            <p:ph type="title"/>
+          </p:nvPr>
+        </p:nvSpPr>
+        <p:spPr/>
+        <p:txBody>
+          <a:bodyPr/>
+          <a:lstStyle/>
+          <a:p>
+            <a:r>
+              <a:rPr lang="es-419" dirty="0"/>
+              <a:t>Integración</a:t>
+            </a:r>
+          </a:p>
+        </p:txBody>
+      </p:sp>
+      <p:sp>
+        <p:nvSpPr>
+          <p:cNvPr id="3" name="Content Placeholder 2">
+            <a:extLst>
+              <a:ext uri="{FF2B5EF4-FFF2-40B4-BE49-F238E27FC236}">
+                <a16:creationId xmlns:a16="http://schemas.microsoft.com/office/drawing/2014/main" id="{0E6E0FE5-347B-42E0-8B2B-1B7872690253}"/>
+              </a:ext>
+            </a:extLst>
+          </p:cNvPr>
+          <p:cNvSpPr>
+            <a:spLocks noGrp="1"/>
+          </p:cNvSpPr>
+          <p:nvPr>
+            <p:ph idx="1"/>
+          </p:nvPr>
+        </p:nvSpPr>
+        <p:spPr/>
+        <p:txBody>
+          <a:bodyPr/>
+          <a:lstStyle/>
+          <a:p>
+            <a:endParaRPr lang="es-419" dirty="0"/>
+          </a:p>
+        </p:txBody>
+      </p:sp>
+      <p:pic>
+        <p:nvPicPr>
+          <p:cNvPr id="4" name="Picture 3">
+            <a:extLst>
+              <a:ext uri="{FF2B5EF4-FFF2-40B4-BE49-F238E27FC236}">
+                <a16:creationId xmlns:a16="http://schemas.microsoft.com/office/drawing/2014/main" id="{52284D96-79DC-41A8-9626-D22A1FCB0D10}"/>
+              </a:ext>
+            </a:extLst>
+          </p:cNvPr>
+          <p:cNvPicPr>
+            <a:picLocks noChangeAspect="1"/>
+          </p:cNvPicPr>
+          <p:nvPr/>
+        </p:nvPicPr>
+        <p:blipFill>
+          <a:blip r:embed="rId2"/>
+          <a:stretch>
+            <a:fillRect/>
+          </a:stretch>
+        </p:blipFill>
+        <p:spPr>
+          <a:xfrm>
+            <a:off x="2375555" y="1690688"/>
+            <a:ext cx="6974902" cy="5087305"/>
+          </a:xfrm>
+          <a:prstGeom prst="rect">
+            <a:avLst/>
+          </a:prstGeom>
+        </p:spPr>
+      </p:pic>
+    </p:spTree>
+    <p:extLst>
+      <p:ext uri="{BB962C8B-B14F-4D97-AF65-F5344CB8AC3E}">
+        <p14:creationId xmlns:p14="http://schemas.microsoft.com/office/powerpoint/2010/main" val="2661713433"/>
+      </p:ext>
+    </p:extLst>
+  </p:cSld>
+  <p:clrMapOvr>
+    <a:masterClrMapping/>
+  </p:clrMapOvr>
+</p:sld>
+</file>
+
+<file path=ppt/slides/slide28.xml><?xml version="1.0" encoding="utf-8"?>
+<p:sld xmlns:a="http://schemas.openxmlformats.org/drawingml/2006/main" xmlns:r="http://schemas.openxmlformats.org/officeDocument/2006/relationships" xmlns:p="http://schemas.openxmlformats.org/presentationml/2006/main">
+  <p:cSld>
+    <p:spTree>
+      <p:nvGrpSpPr>
+        <p:cNvPr id="1" name=""/>
+        <p:cNvGrpSpPr/>
+        <p:nvPr/>
+      </p:nvGrpSpPr>
+      <p:grpSpPr>
+        <a:xfrm>
+          <a:off x="0" y="0"/>
+          <a:ext cx="0" cy="0"/>
+          <a:chOff x="0" y="0"/>
+          <a:chExt cx="0" cy="0"/>
+        </a:xfrm>
+      </p:grpSpPr>
+      <p:sp>
+        <p:nvSpPr>
+          <p:cNvPr id="2" name="Title 1">
+            <a:extLst>
+              <a:ext uri="{FF2B5EF4-FFF2-40B4-BE49-F238E27FC236}">
+                <a16:creationId xmlns:a16="http://schemas.microsoft.com/office/drawing/2014/main" id="{34122DC3-3069-4AF5-AAC9-CD2FFEFF749F}"/>
+              </a:ext>
+            </a:extLst>
+          </p:cNvPr>
+          <p:cNvSpPr>
+            <a:spLocks noGrp="1"/>
+          </p:cNvSpPr>
+          <p:nvPr>
+            <p:ph type="title"/>
+          </p:nvPr>
+        </p:nvSpPr>
+        <p:spPr/>
+        <p:txBody>
+          <a:bodyPr/>
+          <a:lstStyle/>
+          <a:p>
+            <a:r>
+              <a:rPr lang="es-419" dirty="0"/>
+              <a:t>Pruebas de integración</a:t>
+            </a:r>
+          </a:p>
+        </p:txBody>
+      </p:sp>
+      <p:sp>
+        <p:nvSpPr>
+          <p:cNvPr id="3" name="Content Placeholder 2">
+            <a:extLst>
+              <a:ext uri="{FF2B5EF4-FFF2-40B4-BE49-F238E27FC236}">
+                <a16:creationId xmlns:a16="http://schemas.microsoft.com/office/drawing/2014/main" id="{BA116F11-A9C2-48A9-9581-2E05A634296D}"/>
+              </a:ext>
+            </a:extLst>
+          </p:cNvPr>
+          <p:cNvSpPr>
+            <a:spLocks noGrp="1"/>
+          </p:cNvSpPr>
+          <p:nvPr>
+            <p:ph idx="1"/>
+          </p:nvPr>
+        </p:nvSpPr>
+        <p:spPr/>
+        <p:txBody>
+          <a:bodyPr/>
+          <a:lstStyle/>
+          <a:p>
+            <a:r>
+              <a:rPr lang="es-419" dirty="0"/>
+              <a:t>Test del driver en Python</a:t>
+            </a:r>
+          </a:p>
+          <a:p>
+            <a:r>
+              <a:rPr lang="es-419" dirty="0"/>
+              <a:t>Demo</a:t>
+            </a:r>
+          </a:p>
+        </p:txBody>
+      </p:sp>
+    </p:spTree>
+    <p:extLst>
+      <p:ext uri="{BB962C8B-B14F-4D97-AF65-F5344CB8AC3E}">
+        <p14:creationId xmlns:p14="http://schemas.microsoft.com/office/powerpoint/2010/main" val="227321349"/>
       </p:ext>
     </p:extLst>
   </p:cSld>
@@ -3996,6 +6068,390 @@
     <p:extLst>
       <p:ext uri="{BB962C8B-B14F-4D97-AF65-F5344CB8AC3E}">
         <p14:creationId xmlns:p14="http://schemas.microsoft.com/office/powerpoint/2010/main" val="3016701350"/>
+      </p:ext>
+    </p:extLst>
+  </p:cSld>
+  <p:clrMapOvr>
+    <a:masterClrMapping/>
+  </p:clrMapOvr>
+</p:sld>
+</file>
+
+<file path=ppt/slides/slide7.xml><?xml version="1.0" encoding="utf-8"?>
+<p:sld xmlns:a="http://schemas.openxmlformats.org/drawingml/2006/main" xmlns:r="http://schemas.openxmlformats.org/officeDocument/2006/relationships" xmlns:p="http://schemas.openxmlformats.org/presentationml/2006/main">
+  <p:cSld>
+    <p:spTree>
+      <p:nvGrpSpPr>
+        <p:cNvPr id="1" name=""/>
+        <p:cNvGrpSpPr/>
+        <p:nvPr/>
+      </p:nvGrpSpPr>
+      <p:grpSpPr>
+        <a:xfrm>
+          <a:off x="0" y="0"/>
+          <a:ext cx="0" cy="0"/>
+          <a:chOff x="0" y="0"/>
+          <a:chExt cx="0" cy="0"/>
+        </a:xfrm>
+      </p:grpSpPr>
+      <p:sp>
+        <p:nvSpPr>
+          <p:cNvPr id="2" name="Title 1">
+            <a:extLst>
+              <a:ext uri="{FF2B5EF4-FFF2-40B4-BE49-F238E27FC236}">
+                <a16:creationId xmlns:a16="http://schemas.microsoft.com/office/drawing/2014/main" id="{D7A5A74B-83B0-4690-84E5-5E00D2815542}"/>
+              </a:ext>
+            </a:extLst>
+          </p:cNvPr>
+          <p:cNvSpPr>
+            <a:spLocks noGrp="1"/>
+          </p:cNvSpPr>
+          <p:nvPr>
+            <p:ph type="title"/>
+          </p:nvPr>
+        </p:nvSpPr>
+        <p:spPr/>
+        <p:txBody>
+          <a:bodyPr/>
+          <a:lstStyle/>
+          <a:p>
+            <a:r>
+              <a:rPr lang="es-419" dirty="0"/>
+              <a:t>Agenda Sesión II</a:t>
+            </a:r>
+          </a:p>
+        </p:txBody>
+      </p:sp>
+      <p:sp>
+        <p:nvSpPr>
+          <p:cNvPr id="3" name="Content Placeholder 2">
+            <a:extLst>
+              <a:ext uri="{FF2B5EF4-FFF2-40B4-BE49-F238E27FC236}">
+                <a16:creationId xmlns:a16="http://schemas.microsoft.com/office/drawing/2014/main" id="{2298E7D1-FFE0-4643-B078-DF9D69E0A15D}"/>
+              </a:ext>
+            </a:extLst>
+          </p:cNvPr>
+          <p:cNvSpPr>
+            <a:spLocks noGrp="1"/>
+          </p:cNvSpPr>
+          <p:nvPr>
+            <p:ph idx="1"/>
+          </p:nvPr>
+        </p:nvSpPr>
+        <p:spPr/>
+        <p:txBody>
+          <a:bodyPr>
+            <a:normAutofit lnSpcReduction="10000"/>
+          </a:bodyPr>
+          <a:lstStyle/>
+          <a:p>
+            <a:r>
+              <a:rPr lang="es-419" dirty="0"/>
+              <a:t>Mapa de actividades</a:t>
+            </a:r>
+          </a:p>
+          <a:p>
+            <a:r>
+              <a:rPr lang="es-419" dirty="0"/>
+              <a:t>Arquitectura propuesta</a:t>
+            </a:r>
+          </a:p>
+          <a:p>
+            <a:r>
+              <a:rPr lang="es-419" dirty="0"/>
+              <a:t>Aplicación </a:t>
+            </a:r>
+            <a:r>
+              <a:rPr lang="es-419" dirty="0" err="1"/>
+              <a:t>TkInter</a:t>
+            </a:r>
+            <a:endParaRPr lang="es-419" dirty="0"/>
+          </a:p>
+          <a:p>
+            <a:r>
+              <a:rPr lang="es-419" dirty="0"/>
+              <a:t>Librería a bajo nivel para Raspberry </a:t>
+            </a:r>
+          </a:p>
+          <a:p>
+            <a:pPr lvl="1"/>
+            <a:r>
+              <a:rPr lang="es-419" dirty="0"/>
+              <a:t>Interfaz entre lenguajes</a:t>
+            </a:r>
+          </a:p>
+          <a:p>
+            <a:r>
+              <a:rPr lang="es-419" dirty="0"/>
+              <a:t>Arquitectura Hardware </a:t>
+            </a:r>
+          </a:p>
+          <a:p>
+            <a:pPr lvl="1"/>
+            <a:r>
+              <a:rPr lang="es-419" dirty="0"/>
+              <a:t>Interfaz física</a:t>
+            </a:r>
+          </a:p>
+          <a:p>
+            <a:pPr lvl="1"/>
+            <a:r>
+              <a:rPr lang="es-419" dirty="0"/>
+              <a:t>Interfaz </a:t>
+            </a:r>
+            <a:r>
+              <a:rPr lang="es-419" dirty="0" err="1"/>
+              <a:t>gpio</a:t>
+            </a:r>
+            <a:r>
+              <a:rPr lang="es-419" dirty="0"/>
+              <a:t> hacia </a:t>
+            </a:r>
+            <a:r>
+              <a:rPr lang="es-419" dirty="0" err="1"/>
+              <a:t>hsm</a:t>
+            </a:r>
+            <a:endParaRPr lang="es-419" dirty="0"/>
+          </a:p>
+          <a:p>
+            <a:pPr lvl="1"/>
+            <a:r>
+              <a:rPr lang="es-419" dirty="0" err="1"/>
+              <a:t>hsm</a:t>
+            </a:r>
+            <a:endParaRPr lang="es-419" dirty="0"/>
+          </a:p>
+          <a:p>
+            <a:pPr lvl="1"/>
+            <a:r>
+              <a:rPr lang="es-419" dirty="0" err="1"/>
+              <a:t>Testbenches</a:t>
+            </a:r>
+            <a:r>
+              <a:rPr lang="es-419" dirty="0"/>
+              <a:t> </a:t>
+            </a:r>
+          </a:p>
+        </p:txBody>
+      </p:sp>
+    </p:spTree>
+    <p:extLst>
+      <p:ext uri="{BB962C8B-B14F-4D97-AF65-F5344CB8AC3E}">
+        <p14:creationId xmlns:p14="http://schemas.microsoft.com/office/powerpoint/2010/main" val="2439974452"/>
+      </p:ext>
+    </p:extLst>
+  </p:cSld>
+  <p:clrMapOvr>
+    <a:masterClrMapping/>
+  </p:clrMapOvr>
+</p:sld>
+</file>
+
+<file path=ppt/slides/slide8.xml><?xml version="1.0" encoding="utf-8"?>
+<p:sld xmlns:a="http://schemas.openxmlformats.org/drawingml/2006/main" xmlns:r="http://schemas.openxmlformats.org/officeDocument/2006/relationships" xmlns:p="http://schemas.openxmlformats.org/presentationml/2006/main">
+  <p:cSld>
+    <p:spTree>
+      <p:nvGrpSpPr>
+        <p:cNvPr id="1" name=""/>
+        <p:cNvGrpSpPr/>
+        <p:nvPr/>
+      </p:nvGrpSpPr>
+      <p:grpSpPr>
+        <a:xfrm>
+          <a:off x="0" y="0"/>
+          <a:ext cx="0" cy="0"/>
+          <a:chOff x="0" y="0"/>
+          <a:chExt cx="0" cy="0"/>
+        </a:xfrm>
+      </p:grpSpPr>
+      <p:sp>
+        <p:nvSpPr>
+          <p:cNvPr id="2" name="Title 1">
+            <a:extLst>
+              <a:ext uri="{FF2B5EF4-FFF2-40B4-BE49-F238E27FC236}">
+                <a16:creationId xmlns:a16="http://schemas.microsoft.com/office/drawing/2014/main" id="{FA292874-74E7-4EB5-A219-2FFE88445C49}"/>
+              </a:ext>
+            </a:extLst>
+          </p:cNvPr>
+          <p:cNvSpPr>
+            <a:spLocks noGrp="1"/>
+          </p:cNvSpPr>
+          <p:nvPr>
+            <p:ph type="title"/>
+          </p:nvPr>
+        </p:nvSpPr>
+        <p:spPr/>
+        <p:txBody>
+          <a:bodyPr/>
+          <a:lstStyle/>
+          <a:p>
+            <a:r>
+              <a:rPr lang="es-419" dirty="0"/>
+              <a:t>Mapa de actividades</a:t>
+            </a:r>
+          </a:p>
+        </p:txBody>
+      </p:sp>
+      <p:sp>
+        <p:nvSpPr>
+          <p:cNvPr id="3" name="Content Placeholder 2">
+            <a:extLst>
+              <a:ext uri="{FF2B5EF4-FFF2-40B4-BE49-F238E27FC236}">
+                <a16:creationId xmlns:a16="http://schemas.microsoft.com/office/drawing/2014/main" id="{D6656D5F-3F6F-4470-AC09-55F010F4B093}"/>
+              </a:ext>
+            </a:extLst>
+          </p:cNvPr>
+          <p:cNvSpPr>
+            <a:spLocks noGrp="1"/>
+          </p:cNvSpPr>
+          <p:nvPr>
+            <p:ph idx="1"/>
+          </p:nvPr>
+        </p:nvSpPr>
+        <p:spPr/>
+        <p:txBody>
+          <a:bodyPr/>
+          <a:lstStyle/>
+          <a:p>
+            <a:endParaRPr lang="es-419"/>
+          </a:p>
+        </p:txBody>
+      </p:sp>
+      <p:pic>
+        <p:nvPicPr>
+          <p:cNvPr id="4" name="Picture 3">
+            <a:extLst>
+              <a:ext uri="{FF2B5EF4-FFF2-40B4-BE49-F238E27FC236}">
+                <a16:creationId xmlns:a16="http://schemas.microsoft.com/office/drawing/2014/main" id="{0A4BC371-88BA-4568-B60D-CA986074805A}"/>
+              </a:ext>
+            </a:extLst>
+          </p:cNvPr>
+          <p:cNvPicPr>
+            <a:picLocks noChangeAspect="1"/>
+          </p:cNvPicPr>
+          <p:nvPr/>
+        </p:nvPicPr>
+        <p:blipFill>
+          <a:blip r:embed="rId2"/>
+          <a:stretch>
+            <a:fillRect/>
+          </a:stretch>
+        </p:blipFill>
+        <p:spPr>
+          <a:xfrm>
+            <a:off x="0" y="2444601"/>
+            <a:ext cx="12192000" cy="2572113"/>
+          </a:xfrm>
+          <a:prstGeom prst="rect">
+            <a:avLst/>
+          </a:prstGeom>
+        </p:spPr>
+      </p:pic>
+    </p:spTree>
+    <p:extLst>
+      <p:ext uri="{BB962C8B-B14F-4D97-AF65-F5344CB8AC3E}">
+        <p14:creationId xmlns:p14="http://schemas.microsoft.com/office/powerpoint/2010/main" val="1606829599"/>
+      </p:ext>
+    </p:extLst>
+  </p:cSld>
+  <p:clrMapOvr>
+    <a:masterClrMapping/>
+  </p:clrMapOvr>
+</p:sld>
+</file>
+
+<file path=ppt/slides/slide9.xml><?xml version="1.0" encoding="utf-8"?>
+<p:sld xmlns:a="http://schemas.openxmlformats.org/drawingml/2006/main" xmlns:r="http://schemas.openxmlformats.org/officeDocument/2006/relationships" xmlns:p="http://schemas.openxmlformats.org/presentationml/2006/main">
+  <p:cSld>
+    <p:spTree>
+      <p:nvGrpSpPr>
+        <p:cNvPr id="1" name=""/>
+        <p:cNvGrpSpPr/>
+        <p:nvPr/>
+      </p:nvGrpSpPr>
+      <p:grpSpPr>
+        <a:xfrm>
+          <a:off x="0" y="0"/>
+          <a:ext cx="0" cy="0"/>
+          <a:chOff x="0" y="0"/>
+          <a:chExt cx="0" cy="0"/>
+        </a:xfrm>
+      </p:grpSpPr>
+      <p:sp>
+        <p:nvSpPr>
+          <p:cNvPr id="2" name="Title 1">
+            <a:extLst>
+              <a:ext uri="{FF2B5EF4-FFF2-40B4-BE49-F238E27FC236}">
+                <a16:creationId xmlns:a16="http://schemas.microsoft.com/office/drawing/2014/main" id="{D99E9A3F-DD2C-419D-9EB2-FA45D8D68830}"/>
+              </a:ext>
+            </a:extLst>
+          </p:cNvPr>
+          <p:cNvSpPr>
+            <a:spLocks noGrp="1"/>
+          </p:cNvSpPr>
+          <p:nvPr>
+            <p:ph type="title"/>
+          </p:nvPr>
+        </p:nvSpPr>
+        <p:spPr/>
+        <p:txBody>
+          <a:bodyPr/>
+          <a:lstStyle/>
+          <a:p>
+            <a:r>
+              <a:rPr lang="es-419" dirty="0"/>
+              <a:t>Arquitectura propuesta</a:t>
+            </a:r>
+          </a:p>
+        </p:txBody>
+      </p:sp>
+      <p:pic>
+        <p:nvPicPr>
+          <p:cNvPr id="4" name="Content Placeholder 3">
+            <a:extLst>
+              <a:ext uri="{FF2B5EF4-FFF2-40B4-BE49-F238E27FC236}">
+                <a16:creationId xmlns:a16="http://schemas.microsoft.com/office/drawing/2014/main" id="{6B4CC9DC-CD86-42AB-88E2-2E75F20DBE08}"/>
+              </a:ext>
+            </a:extLst>
+          </p:cNvPr>
+          <p:cNvPicPr>
+            <a:picLocks noGrp="1"/>
+          </p:cNvPicPr>
+          <p:nvPr>
+            <p:ph idx="1"/>
+          </p:nvPr>
+        </p:nvPicPr>
+        <p:blipFill>
+          <a:blip r:embed="rId2">
+            <a:extLst>
+              <a:ext uri="{28A0092B-C50C-407E-A947-70E740481C1C}">
+                <a14:useLocalDpi xmlns:a14="http://schemas.microsoft.com/office/drawing/2010/main" val="0"/>
+              </a:ext>
+            </a:extLst>
+          </a:blip>
+          <a:srcRect/>
+          <a:stretch>
+            <a:fillRect/>
+          </a:stretch>
+        </p:blipFill>
+        <p:spPr bwMode="auto">
+          <a:xfrm>
+            <a:off x="3195687" y="1690688"/>
+            <a:ext cx="6126784" cy="4117017"/>
+          </a:xfrm>
+          <a:prstGeom prst="rect">
+            <a:avLst/>
+          </a:prstGeom>
+          <a:noFill/>
+          <a:ln>
+            <a:noFill/>
+          </a:ln>
+        </p:spPr>
+      </p:pic>
+    </p:spTree>
+    <p:extLst>
+      <p:ext uri="{BB962C8B-B14F-4D97-AF65-F5344CB8AC3E}">
+        <p14:creationId xmlns:p14="http://schemas.microsoft.com/office/powerpoint/2010/main" val="3628977868"/>
       </p:ext>
     </p:extLst>
   </p:cSld>

</xml_diff>